<commit_message>
parameter testing for phasing
</commit_message>
<xml_diff>
--- a/output/MATLAB_scripts/results/results.pptx
+++ b/output/MATLAB_scripts/results/results.pptx
@@ -6,7 +6,8 @@
   </p:sldMasterIdLst>
   <p:sldIdLst>
     <p:sldId id="256" r:id="rId2"/>
-    <p:sldId id="257" r:id="rId3"/>
+    <p:sldId id="258" r:id="rId3"/>
+    <p:sldId id="257" r:id="rId4"/>
   </p:sldIdLst>
   <p:sldSz cx="10972800" cy="13716000"/>
   <p:notesSz cx="6858000" cy="9144000"/>
@@ -244,7 +245,7 @@
           <a:p>
             <a:fld id="{B3FBCD4D-283D-4275-9B39-DEFECB59EE20}" type="datetimeFigureOut">
               <a:rPr lang="en-US" smtClean="0"/>
-              <a:t>9/10/2023</a:t>
+              <a:t>9/12/2023</a:t>
             </a:fld>
             <a:endParaRPr lang="en-US"/>
           </a:p>
@@ -414,7 +415,7 @@
           <a:p>
             <a:fld id="{B3FBCD4D-283D-4275-9B39-DEFECB59EE20}" type="datetimeFigureOut">
               <a:rPr lang="en-US" smtClean="0"/>
-              <a:t>9/10/2023</a:t>
+              <a:t>9/12/2023</a:t>
             </a:fld>
             <a:endParaRPr lang="en-US"/>
           </a:p>
@@ -594,7 +595,7 @@
           <a:p>
             <a:fld id="{B3FBCD4D-283D-4275-9B39-DEFECB59EE20}" type="datetimeFigureOut">
               <a:rPr lang="en-US" smtClean="0"/>
-              <a:t>9/10/2023</a:t>
+              <a:t>9/12/2023</a:t>
             </a:fld>
             <a:endParaRPr lang="en-US"/>
           </a:p>
@@ -764,7 +765,7 @@
           <a:p>
             <a:fld id="{B3FBCD4D-283D-4275-9B39-DEFECB59EE20}" type="datetimeFigureOut">
               <a:rPr lang="en-US" smtClean="0"/>
-              <a:t>9/10/2023</a:t>
+              <a:t>9/12/2023</a:t>
             </a:fld>
             <a:endParaRPr lang="en-US"/>
           </a:p>
@@ -1008,7 +1009,7 @@
           <a:p>
             <a:fld id="{B3FBCD4D-283D-4275-9B39-DEFECB59EE20}" type="datetimeFigureOut">
               <a:rPr lang="en-US" smtClean="0"/>
-              <a:t>9/10/2023</a:t>
+              <a:t>9/12/2023</a:t>
             </a:fld>
             <a:endParaRPr lang="en-US"/>
           </a:p>
@@ -1240,7 +1241,7 @@
           <a:p>
             <a:fld id="{B3FBCD4D-283D-4275-9B39-DEFECB59EE20}" type="datetimeFigureOut">
               <a:rPr lang="en-US" smtClean="0"/>
-              <a:t>9/10/2023</a:t>
+              <a:t>9/12/2023</a:t>
             </a:fld>
             <a:endParaRPr lang="en-US"/>
           </a:p>
@@ -1607,7 +1608,7 @@
           <a:p>
             <a:fld id="{B3FBCD4D-283D-4275-9B39-DEFECB59EE20}" type="datetimeFigureOut">
               <a:rPr lang="en-US" smtClean="0"/>
-              <a:t>9/10/2023</a:t>
+              <a:t>9/12/2023</a:t>
             </a:fld>
             <a:endParaRPr lang="en-US"/>
           </a:p>
@@ -1725,7 +1726,7 @@
           <a:p>
             <a:fld id="{B3FBCD4D-283D-4275-9B39-DEFECB59EE20}" type="datetimeFigureOut">
               <a:rPr lang="en-US" smtClean="0"/>
-              <a:t>9/10/2023</a:t>
+              <a:t>9/12/2023</a:t>
             </a:fld>
             <a:endParaRPr lang="en-US"/>
           </a:p>
@@ -1820,7 +1821,7 @@
           <a:p>
             <a:fld id="{B3FBCD4D-283D-4275-9B39-DEFECB59EE20}" type="datetimeFigureOut">
               <a:rPr lang="en-US" smtClean="0"/>
-              <a:t>9/10/2023</a:t>
+              <a:t>9/12/2023</a:t>
             </a:fld>
             <a:endParaRPr lang="en-US"/>
           </a:p>
@@ -2097,7 +2098,7 @@
           <a:p>
             <a:fld id="{B3FBCD4D-283D-4275-9B39-DEFECB59EE20}" type="datetimeFigureOut">
               <a:rPr lang="en-US" smtClean="0"/>
-              <a:t>9/10/2023</a:t>
+              <a:t>9/12/2023</a:t>
             </a:fld>
             <a:endParaRPr lang="en-US"/>
           </a:p>
@@ -2354,7 +2355,7 @@
           <a:p>
             <a:fld id="{B3FBCD4D-283D-4275-9B39-DEFECB59EE20}" type="datetimeFigureOut">
               <a:rPr lang="en-US" smtClean="0"/>
-              <a:t>9/10/2023</a:t>
+              <a:t>9/12/2023</a:t>
             </a:fld>
             <a:endParaRPr lang="en-US"/>
           </a:p>
@@ -2567,7 +2568,7 @@
           <a:p>
             <a:fld id="{B3FBCD4D-283D-4275-9B39-DEFECB59EE20}" type="datetimeFigureOut">
               <a:rPr lang="en-US" smtClean="0"/>
-              <a:t>9/10/2023</a:t>
+              <a:t>9/12/2023</a:t>
             </a:fld>
             <a:endParaRPr lang="en-US"/>
           </a:p>
@@ -4708,6 +4709,1198 @@
       </p:grpSpPr>
       <p:sp>
         <p:nvSpPr>
+          <p:cNvPr id="5" name="Rectangle 4">
+            <a:extLst>
+              <a:ext uri="{FF2B5EF4-FFF2-40B4-BE49-F238E27FC236}">
+                <a16:creationId xmlns:a16="http://schemas.microsoft.com/office/drawing/2014/main" id="{6FE2403B-8A30-B4CD-4CE8-BDA2EED53956}"/>
+              </a:ext>
+            </a:extLst>
+          </p:cNvPr>
+          <p:cNvSpPr/>
+          <p:nvPr/>
+        </p:nvSpPr>
+        <p:spPr>
+          <a:xfrm>
+            <a:off x="2966225" y="233918"/>
+            <a:ext cx="3136900" cy="2565400"/>
+          </a:xfrm>
+          <a:prstGeom prst="rect">
+            <a:avLst/>
+          </a:prstGeom>
+        </p:spPr>
+        <p:style>
+          <a:lnRef idx="2">
+            <a:schemeClr val="accent1">
+              <a:shade val="15000"/>
+            </a:schemeClr>
+          </a:lnRef>
+          <a:fillRef idx="1">
+            <a:schemeClr val="accent1"/>
+          </a:fillRef>
+          <a:effectRef idx="0">
+            <a:schemeClr val="accent1"/>
+          </a:effectRef>
+          <a:fontRef idx="minor">
+            <a:schemeClr val="lt1"/>
+          </a:fontRef>
+        </p:style>
+        <p:txBody>
+          <a:bodyPr rtlCol="0" anchor="ctr"/>
+          <a:lstStyle/>
+          <a:p>
+            <a:pPr algn="ctr"/>
+            <a:r>
+              <a:rPr lang="en-US" dirty="0"/>
+              <a:t>ISM length</a:t>
+            </a:r>
+          </a:p>
+          <a:p>
+            <a:pPr algn="ctr"/>
+            <a:r>
+              <a:rPr lang="en-US" dirty="0"/>
+              <a:t>Force components</a:t>
+            </a:r>
+          </a:p>
+        </p:txBody>
+      </p:sp>
+      <p:sp>
+        <p:nvSpPr>
+          <p:cNvPr id="6" name="Rectangle 5">
+            <a:extLst>
+              <a:ext uri="{FF2B5EF4-FFF2-40B4-BE49-F238E27FC236}">
+                <a16:creationId xmlns:a16="http://schemas.microsoft.com/office/drawing/2014/main" id="{2DD46785-5DD2-16D3-AE56-DB2F24509E90}"/>
+              </a:ext>
+            </a:extLst>
+          </p:cNvPr>
+          <p:cNvSpPr/>
+          <p:nvPr/>
+        </p:nvSpPr>
+        <p:spPr>
+          <a:xfrm>
+            <a:off x="259157" y="4597400"/>
+            <a:ext cx="2387600" cy="774700"/>
+          </a:xfrm>
+          <a:prstGeom prst="rect">
+            <a:avLst/>
+          </a:prstGeom>
+        </p:spPr>
+        <p:style>
+          <a:lnRef idx="2">
+            <a:schemeClr val="accent1">
+              <a:shade val="15000"/>
+            </a:schemeClr>
+          </a:lnRef>
+          <a:fillRef idx="1">
+            <a:schemeClr val="accent1"/>
+          </a:fillRef>
+          <a:effectRef idx="0">
+            <a:schemeClr val="accent1"/>
+          </a:effectRef>
+          <a:fontRef idx="minor">
+            <a:schemeClr val="lt1"/>
+          </a:fontRef>
+        </p:style>
+        <p:txBody>
+          <a:bodyPr rtlCol="0" anchor="ctr"/>
+          <a:lstStyle/>
+          <a:p>
+            <a:pPr algn="ctr"/>
+            <a:r>
+              <a:rPr lang="en-US" dirty="0"/>
+              <a:t>ISM length</a:t>
+            </a:r>
+          </a:p>
+        </p:txBody>
+      </p:sp>
+      <p:sp>
+        <p:nvSpPr>
+          <p:cNvPr id="7" name="Rectangle 6">
+            <a:extLst>
+              <a:ext uri="{FF2B5EF4-FFF2-40B4-BE49-F238E27FC236}">
+                <a16:creationId xmlns:a16="http://schemas.microsoft.com/office/drawing/2014/main" id="{4EF4F6BA-2F2F-D704-74E1-AC1E53BDECAC}"/>
+              </a:ext>
+            </a:extLst>
+          </p:cNvPr>
+          <p:cNvSpPr/>
+          <p:nvPr/>
+        </p:nvSpPr>
+        <p:spPr>
+          <a:xfrm>
+            <a:off x="259157" y="5537200"/>
+            <a:ext cx="2387600" cy="774700"/>
+          </a:xfrm>
+          <a:prstGeom prst="rect">
+            <a:avLst/>
+          </a:prstGeom>
+        </p:spPr>
+        <p:style>
+          <a:lnRef idx="2">
+            <a:schemeClr val="accent1">
+              <a:shade val="15000"/>
+            </a:schemeClr>
+          </a:lnRef>
+          <a:fillRef idx="1">
+            <a:schemeClr val="accent1"/>
+          </a:fillRef>
+          <a:effectRef idx="0">
+            <a:schemeClr val="accent1"/>
+          </a:effectRef>
+          <a:fontRef idx="minor">
+            <a:schemeClr val="lt1"/>
+          </a:fontRef>
+        </p:style>
+        <p:txBody>
+          <a:bodyPr rtlCol="0" anchor="ctr"/>
+          <a:lstStyle/>
+          <a:p>
+            <a:pPr algn="ctr"/>
+            <a:r>
+              <a:rPr lang="en-US" dirty="0"/>
+              <a:t>C2 top XYZ</a:t>
+            </a:r>
+          </a:p>
+        </p:txBody>
+      </p:sp>
+      <p:sp>
+        <p:nvSpPr>
+          <p:cNvPr id="8" name="Rectangle 7">
+            <a:extLst>
+              <a:ext uri="{FF2B5EF4-FFF2-40B4-BE49-F238E27FC236}">
+                <a16:creationId xmlns:a16="http://schemas.microsoft.com/office/drawing/2014/main" id="{1A1E933B-577A-006D-24F4-FB641ED16AE2}"/>
+              </a:ext>
+            </a:extLst>
+          </p:cNvPr>
+          <p:cNvSpPr/>
+          <p:nvPr/>
+        </p:nvSpPr>
+        <p:spPr>
+          <a:xfrm>
+            <a:off x="259157" y="6477000"/>
+            <a:ext cx="2387600" cy="774700"/>
+          </a:xfrm>
+          <a:prstGeom prst="rect">
+            <a:avLst/>
+          </a:prstGeom>
+        </p:spPr>
+        <p:style>
+          <a:lnRef idx="2">
+            <a:schemeClr val="accent1">
+              <a:shade val="15000"/>
+            </a:schemeClr>
+          </a:lnRef>
+          <a:fillRef idx="1">
+            <a:schemeClr val="accent1"/>
+          </a:fillRef>
+          <a:effectRef idx="0">
+            <a:schemeClr val="accent1"/>
+          </a:effectRef>
+          <a:fontRef idx="minor">
+            <a:schemeClr val="lt1"/>
+          </a:fontRef>
+        </p:style>
+        <p:txBody>
+          <a:bodyPr rtlCol="0" anchor="ctr"/>
+          <a:lstStyle/>
+          <a:p>
+            <a:pPr algn="ctr"/>
+            <a:r>
+              <a:rPr lang="en-US" dirty="0"/>
+              <a:t>C2 angles</a:t>
+            </a:r>
+          </a:p>
+        </p:txBody>
+      </p:sp>
+      <p:sp>
+        <p:nvSpPr>
+          <p:cNvPr id="9" name="Rectangle 8">
+            <a:extLst>
+              <a:ext uri="{FF2B5EF4-FFF2-40B4-BE49-F238E27FC236}">
+                <a16:creationId xmlns:a16="http://schemas.microsoft.com/office/drawing/2014/main" id="{30E698C6-95B8-6E5D-02AC-F51EF40402A3}"/>
+              </a:ext>
+            </a:extLst>
+          </p:cNvPr>
+          <p:cNvSpPr/>
+          <p:nvPr/>
+        </p:nvSpPr>
+        <p:spPr>
+          <a:xfrm>
+            <a:off x="2824557" y="4584700"/>
+            <a:ext cx="2387600" cy="774700"/>
+          </a:xfrm>
+          <a:prstGeom prst="rect">
+            <a:avLst/>
+          </a:prstGeom>
+        </p:spPr>
+        <p:style>
+          <a:lnRef idx="2">
+            <a:schemeClr val="accent1">
+              <a:shade val="15000"/>
+            </a:schemeClr>
+          </a:lnRef>
+          <a:fillRef idx="1">
+            <a:schemeClr val="accent1"/>
+          </a:fillRef>
+          <a:effectRef idx="0">
+            <a:schemeClr val="accent1"/>
+          </a:effectRef>
+          <a:fontRef idx="minor">
+            <a:schemeClr val="lt1"/>
+          </a:fontRef>
+        </p:style>
+        <p:txBody>
+          <a:bodyPr rtlCol="0" anchor="ctr"/>
+          <a:lstStyle/>
+          <a:p>
+            <a:pPr algn="ctr"/>
+            <a:r>
+              <a:rPr lang="en-US" dirty="0"/>
+              <a:t>ISM length</a:t>
+            </a:r>
+          </a:p>
+        </p:txBody>
+      </p:sp>
+      <p:sp>
+        <p:nvSpPr>
+          <p:cNvPr id="10" name="Rectangle 9">
+            <a:extLst>
+              <a:ext uri="{FF2B5EF4-FFF2-40B4-BE49-F238E27FC236}">
+                <a16:creationId xmlns:a16="http://schemas.microsoft.com/office/drawing/2014/main" id="{86BDE638-B68B-990A-9342-119491030035}"/>
+              </a:ext>
+            </a:extLst>
+          </p:cNvPr>
+          <p:cNvSpPr/>
+          <p:nvPr/>
+        </p:nvSpPr>
+        <p:spPr>
+          <a:xfrm>
+            <a:off x="2824557" y="5524500"/>
+            <a:ext cx="2387600" cy="774700"/>
+          </a:xfrm>
+          <a:prstGeom prst="rect">
+            <a:avLst/>
+          </a:prstGeom>
+        </p:spPr>
+        <p:style>
+          <a:lnRef idx="2">
+            <a:schemeClr val="accent1">
+              <a:shade val="15000"/>
+            </a:schemeClr>
+          </a:lnRef>
+          <a:fillRef idx="1">
+            <a:schemeClr val="accent1"/>
+          </a:fillRef>
+          <a:effectRef idx="0">
+            <a:schemeClr val="accent1"/>
+          </a:effectRef>
+          <a:fontRef idx="minor">
+            <a:schemeClr val="lt1"/>
+          </a:fontRef>
+        </p:style>
+        <p:txBody>
+          <a:bodyPr rtlCol="0" anchor="ctr"/>
+          <a:lstStyle/>
+          <a:p>
+            <a:pPr algn="ctr"/>
+            <a:r>
+              <a:rPr lang="en-US" dirty="0"/>
+              <a:t>C2 top XYZ</a:t>
+            </a:r>
+          </a:p>
+        </p:txBody>
+      </p:sp>
+      <p:sp>
+        <p:nvSpPr>
+          <p:cNvPr id="11" name="Rectangle 10">
+            <a:extLst>
+              <a:ext uri="{FF2B5EF4-FFF2-40B4-BE49-F238E27FC236}">
+                <a16:creationId xmlns:a16="http://schemas.microsoft.com/office/drawing/2014/main" id="{09AE9193-9AA4-1D0B-F47C-CED2D6ADA1C1}"/>
+              </a:ext>
+            </a:extLst>
+          </p:cNvPr>
+          <p:cNvSpPr/>
+          <p:nvPr/>
+        </p:nvSpPr>
+        <p:spPr>
+          <a:xfrm>
+            <a:off x="2824557" y="6464300"/>
+            <a:ext cx="2387600" cy="774700"/>
+          </a:xfrm>
+          <a:prstGeom prst="rect">
+            <a:avLst/>
+          </a:prstGeom>
+        </p:spPr>
+        <p:style>
+          <a:lnRef idx="2">
+            <a:schemeClr val="accent1">
+              <a:shade val="15000"/>
+            </a:schemeClr>
+          </a:lnRef>
+          <a:fillRef idx="1">
+            <a:schemeClr val="accent1"/>
+          </a:fillRef>
+          <a:effectRef idx="0">
+            <a:schemeClr val="accent1"/>
+          </a:effectRef>
+          <a:fontRef idx="minor">
+            <a:schemeClr val="lt1"/>
+          </a:fontRef>
+        </p:style>
+        <p:txBody>
+          <a:bodyPr rtlCol="0" anchor="ctr"/>
+          <a:lstStyle/>
+          <a:p>
+            <a:pPr algn="ctr"/>
+            <a:r>
+              <a:rPr lang="en-US" dirty="0"/>
+              <a:t>C2 angles</a:t>
+            </a:r>
+          </a:p>
+        </p:txBody>
+      </p:sp>
+      <p:sp>
+        <p:nvSpPr>
+          <p:cNvPr id="15" name="Rectangle 14">
+            <a:extLst>
+              <a:ext uri="{FF2B5EF4-FFF2-40B4-BE49-F238E27FC236}">
+                <a16:creationId xmlns:a16="http://schemas.microsoft.com/office/drawing/2014/main" id="{7C03963E-0484-4F3C-AE94-DCE42773AE19}"/>
+              </a:ext>
+            </a:extLst>
+          </p:cNvPr>
+          <p:cNvSpPr/>
+          <p:nvPr/>
+        </p:nvSpPr>
+        <p:spPr>
+          <a:xfrm>
+            <a:off x="5466157" y="4597400"/>
+            <a:ext cx="2387600" cy="774700"/>
+          </a:xfrm>
+          <a:prstGeom prst="rect">
+            <a:avLst/>
+          </a:prstGeom>
+        </p:spPr>
+        <p:style>
+          <a:lnRef idx="2">
+            <a:schemeClr val="accent1">
+              <a:shade val="15000"/>
+            </a:schemeClr>
+          </a:lnRef>
+          <a:fillRef idx="1">
+            <a:schemeClr val="accent1"/>
+          </a:fillRef>
+          <a:effectRef idx="0">
+            <a:schemeClr val="accent1"/>
+          </a:effectRef>
+          <a:fontRef idx="minor">
+            <a:schemeClr val="lt1"/>
+          </a:fontRef>
+        </p:style>
+        <p:txBody>
+          <a:bodyPr rtlCol="0" anchor="ctr"/>
+          <a:lstStyle/>
+          <a:p>
+            <a:pPr algn="ctr"/>
+            <a:r>
+              <a:rPr lang="en-US" dirty="0"/>
+              <a:t>ISM length</a:t>
+            </a:r>
+          </a:p>
+        </p:txBody>
+      </p:sp>
+      <p:sp>
+        <p:nvSpPr>
+          <p:cNvPr id="16" name="Rectangle 15">
+            <a:extLst>
+              <a:ext uri="{FF2B5EF4-FFF2-40B4-BE49-F238E27FC236}">
+                <a16:creationId xmlns:a16="http://schemas.microsoft.com/office/drawing/2014/main" id="{1F6A39A7-B8D4-60B5-0AE3-A986A7AB00BF}"/>
+              </a:ext>
+            </a:extLst>
+          </p:cNvPr>
+          <p:cNvSpPr/>
+          <p:nvPr/>
+        </p:nvSpPr>
+        <p:spPr>
+          <a:xfrm>
+            <a:off x="5466157" y="5537200"/>
+            <a:ext cx="2387600" cy="774700"/>
+          </a:xfrm>
+          <a:prstGeom prst="rect">
+            <a:avLst/>
+          </a:prstGeom>
+        </p:spPr>
+        <p:style>
+          <a:lnRef idx="2">
+            <a:schemeClr val="accent1">
+              <a:shade val="15000"/>
+            </a:schemeClr>
+          </a:lnRef>
+          <a:fillRef idx="1">
+            <a:schemeClr val="accent1"/>
+          </a:fillRef>
+          <a:effectRef idx="0">
+            <a:schemeClr val="accent1"/>
+          </a:effectRef>
+          <a:fontRef idx="minor">
+            <a:schemeClr val="lt1"/>
+          </a:fontRef>
+        </p:style>
+        <p:txBody>
+          <a:bodyPr rtlCol="0" anchor="ctr"/>
+          <a:lstStyle/>
+          <a:p>
+            <a:pPr algn="ctr"/>
+            <a:r>
+              <a:rPr lang="en-US" dirty="0"/>
+              <a:t>C2 top XYZ</a:t>
+            </a:r>
+          </a:p>
+        </p:txBody>
+      </p:sp>
+      <p:sp>
+        <p:nvSpPr>
+          <p:cNvPr id="17" name="Rectangle 16">
+            <a:extLst>
+              <a:ext uri="{FF2B5EF4-FFF2-40B4-BE49-F238E27FC236}">
+                <a16:creationId xmlns:a16="http://schemas.microsoft.com/office/drawing/2014/main" id="{0F3219E2-93B0-12FA-95ED-A0FA7869E1E7}"/>
+              </a:ext>
+            </a:extLst>
+          </p:cNvPr>
+          <p:cNvSpPr/>
+          <p:nvPr/>
+        </p:nvSpPr>
+        <p:spPr>
+          <a:xfrm>
+            <a:off x="5466157" y="6477000"/>
+            <a:ext cx="2387600" cy="774700"/>
+          </a:xfrm>
+          <a:prstGeom prst="rect">
+            <a:avLst/>
+          </a:prstGeom>
+        </p:spPr>
+        <p:style>
+          <a:lnRef idx="2">
+            <a:schemeClr val="accent1">
+              <a:shade val="15000"/>
+            </a:schemeClr>
+          </a:lnRef>
+          <a:fillRef idx="1">
+            <a:schemeClr val="accent1"/>
+          </a:fillRef>
+          <a:effectRef idx="0">
+            <a:schemeClr val="accent1"/>
+          </a:effectRef>
+          <a:fontRef idx="minor">
+            <a:schemeClr val="lt1"/>
+          </a:fontRef>
+        </p:style>
+        <p:txBody>
+          <a:bodyPr rtlCol="0" anchor="ctr"/>
+          <a:lstStyle/>
+          <a:p>
+            <a:pPr algn="ctr"/>
+            <a:r>
+              <a:rPr lang="en-US" dirty="0"/>
+              <a:t>C2 angles</a:t>
+            </a:r>
+          </a:p>
+        </p:txBody>
+      </p:sp>
+      <p:sp>
+        <p:nvSpPr>
+          <p:cNvPr id="18" name="Rectangle 17">
+            <a:extLst>
+              <a:ext uri="{FF2B5EF4-FFF2-40B4-BE49-F238E27FC236}">
+                <a16:creationId xmlns:a16="http://schemas.microsoft.com/office/drawing/2014/main" id="{AE0C3B8B-B8B2-981F-D025-10424B495DEE}"/>
+              </a:ext>
+            </a:extLst>
+          </p:cNvPr>
+          <p:cNvSpPr/>
+          <p:nvPr/>
+        </p:nvSpPr>
+        <p:spPr>
+          <a:xfrm>
+            <a:off x="256952" y="7829550"/>
+            <a:ext cx="2387600" cy="774700"/>
+          </a:xfrm>
+          <a:prstGeom prst="rect">
+            <a:avLst/>
+          </a:prstGeom>
+        </p:spPr>
+        <p:style>
+          <a:lnRef idx="2">
+            <a:schemeClr val="accent1">
+              <a:shade val="15000"/>
+            </a:schemeClr>
+          </a:lnRef>
+          <a:fillRef idx="1">
+            <a:schemeClr val="accent1"/>
+          </a:fillRef>
+          <a:effectRef idx="0">
+            <a:schemeClr val="accent1"/>
+          </a:effectRef>
+          <a:fontRef idx="minor">
+            <a:schemeClr val="lt1"/>
+          </a:fontRef>
+        </p:style>
+        <p:txBody>
+          <a:bodyPr rtlCol="0" anchor="ctr"/>
+          <a:lstStyle/>
+          <a:p>
+            <a:pPr algn="ctr"/>
+            <a:r>
+              <a:rPr lang="en-US" dirty="0"/>
+              <a:t>ISM length</a:t>
+            </a:r>
+          </a:p>
+        </p:txBody>
+      </p:sp>
+      <p:sp>
+        <p:nvSpPr>
+          <p:cNvPr id="19" name="Rectangle 18">
+            <a:extLst>
+              <a:ext uri="{FF2B5EF4-FFF2-40B4-BE49-F238E27FC236}">
+                <a16:creationId xmlns:a16="http://schemas.microsoft.com/office/drawing/2014/main" id="{44D0A1BE-1FBB-A7E3-F91E-273805FAB85C}"/>
+              </a:ext>
+            </a:extLst>
+          </p:cNvPr>
+          <p:cNvSpPr/>
+          <p:nvPr/>
+        </p:nvSpPr>
+        <p:spPr>
+          <a:xfrm>
+            <a:off x="256952" y="8769350"/>
+            <a:ext cx="2387600" cy="774700"/>
+          </a:xfrm>
+          <a:prstGeom prst="rect">
+            <a:avLst/>
+          </a:prstGeom>
+        </p:spPr>
+        <p:style>
+          <a:lnRef idx="2">
+            <a:schemeClr val="accent1">
+              <a:shade val="15000"/>
+            </a:schemeClr>
+          </a:lnRef>
+          <a:fillRef idx="1">
+            <a:schemeClr val="accent1"/>
+          </a:fillRef>
+          <a:effectRef idx="0">
+            <a:schemeClr val="accent1"/>
+          </a:effectRef>
+          <a:fontRef idx="minor">
+            <a:schemeClr val="lt1"/>
+          </a:fontRef>
+        </p:style>
+        <p:txBody>
+          <a:bodyPr rtlCol="0" anchor="ctr"/>
+          <a:lstStyle/>
+          <a:p>
+            <a:pPr algn="ctr"/>
+            <a:r>
+              <a:rPr lang="en-US" dirty="0"/>
+              <a:t>C2 top XYZ</a:t>
+            </a:r>
+          </a:p>
+        </p:txBody>
+      </p:sp>
+      <p:sp>
+        <p:nvSpPr>
+          <p:cNvPr id="20" name="Rectangle 19">
+            <a:extLst>
+              <a:ext uri="{FF2B5EF4-FFF2-40B4-BE49-F238E27FC236}">
+                <a16:creationId xmlns:a16="http://schemas.microsoft.com/office/drawing/2014/main" id="{9FC9B00E-CE89-1B51-29F3-B6700D0A12BF}"/>
+              </a:ext>
+            </a:extLst>
+          </p:cNvPr>
+          <p:cNvSpPr/>
+          <p:nvPr/>
+        </p:nvSpPr>
+        <p:spPr>
+          <a:xfrm>
+            <a:off x="256952" y="9709150"/>
+            <a:ext cx="2387600" cy="774700"/>
+          </a:xfrm>
+          <a:prstGeom prst="rect">
+            <a:avLst/>
+          </a:prstGeom>
+        </p:spPr>
+        <p:style>
+          <a:lnRef idx="2">
+            <a:schemeClr val="accent1">
+              <a:shade val="15000"/>
+            </a:schemeClr>
+          </a:lnRef>
+          <a:fillRef idx="1">
+            <a:schemeClr val="accent1"/>
+          </a:fillRef>
+          <a:effectRef idx="0">
+            <a:schemeClr val="accent1"/>
+          </a:effectRef>
+          <a:fontRef idx="minor">
+            <a:schemeClr val="lt1"/>
+          </a:fontRef>
+        </p:style>
+        <p:txBody>
+          <a:bodyPr rtlCol="0" anchor="ctr"/>
+          <a:lstStyle/>
+          <a:p>
+            <a:pPr algn="ctr"/>
+            <a:r>
+              <a:rPr lang="en-US" dirty="0"/>
+              <a:t>C2 angles</a:t>
+            </a:r>
+          </a:p>
+        </p:txBody>
+      </p:sp>
+      <p:sp>
+        <p:nvSpPr>
+          <p:cNvPr id="21" name="TextBox 20">
+            <a:extLst>
+              <a:ext uri="{FF2B5EF4-FFF2-40B4-BE49-F238E27FC236}">
+                <a16:creationId xmlns:a16="http://schemas.microsoft.com/office/drawing/2014/main" id="{6E272F5E-4357-B697-310E-03AE3A1CBBAC}"/>
+              </a:ext>
+            </a:extLst>
+          </p:cNvPr>
+          <p:cNvSpPr txBox="1"/>
+          <p:nvPr/>
+        </p:nvSpPr>
+        <p:spPr>
+          <a:xfrm>
+            <a:off x="953461" y="4330184"/>
+            <a:ext cx="998991" cy="369332"/>
+          </a:xfrm>
+          <a:prstGeom prst="rect">
+            <a:avLst/>
+          </a:prstGeom>
+          <a:noFill/>
+        </p:spPr>
+        <p:txBody>
+          <a:bodyPr wrap="none" rtlCol="0">
+            <a:spAutoFit/>
+          </a:bodyPr>
+          <a:lstStyle/>
+          <a:p>
+            <a:r>
+              <a:rPr lang="en-US" dirty="0"/>
+              <a:t>ISM only</a:t>
+            </a:r>
+          </a:p>
+        </p:txBody>
+      </p:sp>
+      <p:sp>
+        <p:nvSpPr>
+          <p:cNvPr id="22" name="TextBox 21">
+            <a:extLst>
+              <a:ext uri="{FF2B5EF4-FFF2-40B4-BE49-F238E27FC236}">
+                <a16:creationId xmlns:a16="http://schemas.microsoft.com/office/drawing/2014/main" id="{CB006CD7-A242-CF48-BE5C-02BC1F11626A}"/>
+              </a:ext>
+            </a:extLst>
+          </p:cNvPr>
+          <p:cNvSpPr txBox="1"/>
+          <p:nvPr/>
+        </p:nvSpPr>
+        <p:spPr>
+          <a:xfrm>
+            <a:off x="3499625" y="4316968"/>
+            <a:ext cx="1037463" cy="369332"/>
+          </a:xfrm>
+          <a:prstGeom prst="rect">
+            <a:avLst/>
+          </a:prstGeom>
+          <a:noFill/>
+        </p:spPr>
+        <p:txBody>
+          <a:bodyPr wrap="none" rtlCol="0">
+            <a:spAutoFit/>
+          </a:bodyPr>
+          <a:lstStyle/>
+          <a:p>
+            <a:r>
+              <a:rPr lang="en-US" dirty="0"/>
+              <a:t>N M only</a:t>
+            </a:r>
+          </a:p>
+        </p:txBody>
+      </p:sp>
+      <p:sp>
+        <p:nvSpPr>
+          <p:cNvPr id="23" name="TextBox 22">
+            <a:extLst>
+              <a:ext uri="{FF2B5EF4-FFF2-40B4-BE49-F238E27FC236}">
+                <a16:creationId xmlns:a16="http://schemas.microsoft.com/office/drawing/2014/main" id="{EB9B8E11-8E7D-492A-9CA0-6298C93D62A0}"/>
+              </a:ext>
+            </a:extLst>
+          </p:cNvPr>
+          <p:cNvSpPr txBox="1"/>
+          <p:nvPr/>
+        </p:nvSpPr>
+        <p:spPr>
+          <a:xfrm>
+            <a:off x="6103125" y="4316968"/>
+            <a:ext cx="1301959" cy="369332"/>
+          </a:xfrm>
+          <a:prstGeom prst="rect">
+            <a:avLst/>
+          </a:prstGeom>
+          <a:noFill/>
+        </p:spPr>
+        <p:txBody>
+          <a:bodyPr wrap="none" rtlCol="0">
+            <a:spAutoFit/>
+          </a:bodyPr>
+          <a:lstStyle/>
+          <a:p>
+            <a:r>
+              <a:rPr lang="en-US" dirty="0"/>
+              <a:t>PIP PM only</a:t>
+            </a:r>
+          </a:p>
+        </p:txBody>
+      </p:sp>
+      <p:sp>
+        <p:nvSpPr>
+          <p:cNvPr id="24" name="TextBox 23">
+            <a:extLst>
+              <a:ext uri="{FF2B5EF4-FFF2-40B4-BE49-F238E27FC236}">
+                <a16:creationId xmlns:a16="http://schemas.microsoft.com/office/drawing/2014/main" id="{BE27A477-2B14-C6DA-AB14-B68A8BF49B36}"/>
+              </a:ext>
+            </a:extLst>
+          </p:cNvPr>
+          <p:cNvSpPr txBox="1"/>
+          <p:nvPr/>
+        </p:nvSpPr>
+        <p:spPr>
+          <a:xfrm>
+            <a:off x="693909" y="7560786"/>
+            <a:ext cx="1703736" cy="369332"/>
+          </a:xfrm>
+          <a:prstGeom prst="rect">
+            <a:avLst/>
+          </a:prstGeom>
+          <a:noFill/>
+        </p:spPr>
+        <p:txBody>
+          <a:bodyPr wrap="none" rtlCol="0">
+            <a:spAutoFit/>
+          </a:bodyPr>
+          <a:lstStyle/>
+          <a:p>
+            <a:r>
+              <a:rPr lang="en-US" dirty="0"/>
+              <a:t>Together in sync</a:t>
+            </a:r>
+          </a:p>
+        </p:txBody>
+      </p:sp>
+      <p:sp>
+        <p:nvSpPr>
+          <p:cNvPr id="25" name="Rectangle 24">
+            <a:extLst>
+              <a:ext uri="{FF2B5EF4-FFF2-40B4-BE49-F238E27FC236}">
+                <a16:creationId xmlns:a16="http://schemas.microsoft.com/office/drawing/2014/main" id="{8D1418BB-6EA8-7FB4-2112-452A41598B4E}"/>
+              </a:ext>
+            </a:extLst>
+          </p:cNvPr>
+          <p:cNvSpPr/>
+          <p:nvPr/>
+        </p:nvSpPr>
+        <p:spPr>
+          <a:xfrm>
+            <a:off x="2824557" y="7829550"/>
+            <a:ext cx="2387600" cy="774700"/>
+          </a:xfrm>
+          <a:prstGeom prst="rect">
+            <a:avLst/>
+          </a:prstGeom>
+        </p:spPr>
+        <p:style>
+          <a:lnRef idx="2">
+            <a:schemeClr val="accent1">
+              <a:shade val="15000"/>
+            </a:schemeClr>
+          </a:lnRef>
+          <a:fillRef idx="1">
+            <a:schemeClr val="accent1"/>
+          </a:fillRef>
+          <a:effectRef idx="0">
+            <a:schemeClr val="accent1"/>
+          </a:effectRef>
+          <a:fontRef idx="minor">
+            <a:schemeClr val="lt1"/>
+          </a:fontRef>
+        </p:style>
+        <p:txBody>
+          <a:bodyPr rtlCol="0" anchor="ctr"/>
+          <a:lstStyle/>
+          <a:p>
+            <a:pPr algn="ctr"/>
+            <a:r>
+              <a:rPr lang="en-US" dirty="0"/>
+              <a:t>ISM length</a:t>
+            </a:r>
+          </a:p>
+        </p:txBody>
+      </p:sp>
+      <p:sp>
+        <p:nvSpPr>
+          <p:cNvPr id="26" name="Rectangle 25">
+            <a:extLst>
+              <a:ext uri="{FF2B5EF4-FFF2-40B4-BE49-F238E27FC236}">
+                <a16:creationId xmlns:a16="http://schemas.microsoft.com/office/drawing/2014/main" id="{19B2E63B-4A4D-0CFD-B30D-065FA0089BA6}"/>
+              </a:ext>
+            </a:extLst>
+          </p:cNvPr>
+          <p:cNvSpPr/>
+          <p:nvPr/>
+        </p:nvSpPr>
+        <p:spPr>
+          <a:xfrm>
+            <a:off x="2824557" y="8769350"/>
+            <a:ext cx="2387600" cy="774700"/>
+          </a:xfrm>
+          <a:prstGeom prst="rect">
+            <a:avLst/>
+          </a:prstGeom>
+        </p:spPr>
+        <p:style>
+          <a:lnRef idx="2">
+            <a:schemeClr val="accent1">
+              <a:shade val="15000"/>
+            </a:schemeClr>
+          </a:lnRef>
+          <a:fillRef idx="1">
+            <a:schemeClr val="accent1"/>
+          </a:fillRef>
+          <a:effectRef idx="0">
+            <a:schemeClr val="accent1"/>
+          </a:effectRef>
+          <a:fontRef idx="minor">
+            <a:schemeClr val="lt1"/>
+          </a:fontRef>
+        </p:style>
+        <p:txBody>
+          <a:bodyPr rtlCol="0" anchor="ctr"/>
+          <a:lstStyle/>
+          <a:p>
+            <a:pPr algn="ctr"/>
+            <a:r>
+              <a:rPr lang="en-US" dirty="0"/>
+              <a:t>C2 top XYZ</a:t>
+            </a:r>
+          </a:p>
+        </p:txBody>
+      </p:sp>
+      <p:sp>
+        <p:nvSpPr>
+          <p:cNvPr id="27" name="Rectangle 26">
+            <a:extLst>
+              <a:ext uri="{FF2B5EF4-FFF2-40B4-BE49-F238E27FC236}">
+                <a16:creationId xmlns:a16="http://schemas.microsoft.com/office/drawing/2014/main" id="{7BE86450-F1AA-110B-4862-E6AAB0091A25}"/>
+              </a:ext>
+            </a:extLst>
+          </p:cNvPr>
+          <p:cNvSpPr/>
+          <p:nvPr/>
+        </p:nvSpPr>
+        <p:spPr>
+          <a:xfrm>
+            <a:off x="2824557" y="9709150"/>
+            <a:ext cx="2387600" cy="774700"/>
+          </a:xfrm>
+          <a:prstGeom prst="rect">
+            <a:avLst/>
+          </a:prstGeom>
+        </p:spPr>
+        <p:style>
+          <a:lnRef idx="2">
+            <a:schemeClr val="accent1">
+              <a:shade val="15000"/>
+            </a:schemeClr>
+          </a:lnRef>
+          <a:fillRef idx="1">
+            <a:schemeClr val="accent1"/>
+          </a:fillRef>
+          <a:effectRef idx="0">
+            <a:schemeClr val="accent1"/>
+          </a:effectRef>
+          <a:fontRef idx="minor">
+            <a:schemeClr val="lt1"/>
+          </a:fontRef>
+        </p:style>
+        <p:txBody>
+          <a:bodyPr rtlCol="0" anchor="ctr"/>
+          <a:lstStyle/>
+          <a:p>
+            <a:pPr algn="ctr"/>
+            <a:r>
+              <a:rPr lang="en-US" dirty="0"/>
+              <a:t>C2 angles</a:t>
+            </a:r>
+          </a:p>
+        </p:txBody>
+      </p:sp>
+      <p:sp>
+        <p:nvSpPr>
+          <p:cNvPr id="28" name="TextBox 27">
+            <a:extLst>
+              <a:ext uri="{FF2B5EF4-FFF2-40B4-BE49-F238E27FC236}">
+                <a16:creationId xmlns:a16="http://schemas.microsoft.com/office/drawing/2014/main" id="{7DEC1916-6A68-EF66-7115-15B6DF9B96A9}"/>
+              </a:ext>
+            </a:extLst>
+          </p:cNvPr>
+          <p:cNvSpPr txBox="1"/>
+          <p:nvPr/>
+        </p:nvSpPr>
+        <p:spPr>
+          <a:xfrm>
+            <a:off x="3261514" y="7560786"/>
+            <a:ext cx="2094869" cy="369332"/>
+          </a:xfrm>
+          <a:prstGeom prst="rect">
+            <a:avLst/>
+          </a:prstGeom>
+          <a:noFill/>
+        </p:spPr>
+        <p:txBody>
+          <a:bodyPr wrap="none" rtlCol="0">
+            <a:spAutoFit/>
+          </a:bodyPr>
+          <a:lstStyle/>
+          <a:p>
+            <a:r>
+              <a:rPr lang="en-US" dirty="0"/>
+              <a:t>Together out of sync</a:t>
+            </a:r>
+          </a:p>
+        </p:txBody>
+      </p:sp>
+      <p:sp>
+        <p:nvSpPr>
+          <p:cNvPr id="29" name="Rectangle 28">
+            <a:extLst>
+              <a:ext uri="{FF2B5EF4-FFF2-40B4-BE49-F238E27FC236}">
+                <a16:creationId xmlns:a16="http://schemas.microsoft.com/office/drawing/2014/main" id="{C7F9C191-06B3-72B3-2C65-6F7B4BDAD98C}"/>
+              </a:ext>
+            </a:extLst>
+          </p:cNvPr>
+          <p:cNvSpPr/>
+          <p:nvPr/>
+        </p:nvSpPr>
+        <p:spPr>
+          <a:xfrm>
+            <a:off x="256952" y="3115786"/>
+            <a:ext cx="2387600" cy="1208564"/>
+          </a:xfrm>
+          <a:prstGeom prst="rect">
+            <a:avLst/>
+          </a:prstGeom>
+        </p:spPr>
+        <p:style>
+          <a:lnRef idx="2">
+            <a:schemeClr val="accent1">
+              <a:shade val="15000"/>
+            </a:schemeClr>
+          </a:lnRef>
+          <a:fillRef idx="1">
+            <a:schemeClr val="accent1"/>
+          </a:fillRef>
+          <a:effectRef idx="0">
+            <a:schemeClr val="accent1"/>
+          </a:effectRef>
+          <a:fontRef idx="minor">
+            <a:schemeClr val="lt1"/>
+          </a:fontRef>
+        </p:style>
+        <p:txBody>
+          <a:bodyPr rtlCol="0" anchor="ctr"/>
+          <a:lstStyle/>
+          <a:p>
+            <a:pPr algn="ctr"/>
+            <a:r>
+              <a:rPr lang="en-US" dirty="0"/>
+              <a:t>Small illustration</a:t>
+            </a:r>
+          </a:p>
+        </p:txBody>
+      </p:sp>
+      <p:sp>
+        <p:nvSpPr>
+          <p:cNvPr id="30" name="Rectangle 29">
+            <a:extLst>
+              <a:ext uri="{FF2B5EF4-FFF2-40B4-BE49-F238E27FC236}">
+                <a16:creationId xmlns:a16="http://schemas.microsoft.com/office/drawing/2014/main" id="{943DF5C7-6283-F173-7962-C9A3B7829C02}"/>
+              </a:ext>
+            </a:extLst>
+          </p:cNvPr>
+          <p:cNvSpPr/>
+          <p:nvPr/>
+        </p:nvSpPr>
+        <p:spPr>
+          <a:xfrm>
+            <a:off x="2824556" y="3128486"/>
+            <a:ext cx="2387600" cy="1208564"/>
+          </a:xfrm>
+          <a:prstGeom prst="rect">
+            <a:avLst/>
+          </a:prstGeom>
+        </p:spPr>
+        <p:style>
+          <a:lnRef idx="2">
+            <a:schemeClr val="accent1">
+              <a:shade val="15000"/>
+            </a:schemeClr>
+          </a:lnRef>
+          <a:fillRef idx="1">
+            <a:schemeClr val="accent1"/>
+          </a:fillRef>
+          <a:effectRef idx="0">
+            <a:schemeClr val="accent1"/>
+          </a:effectRef>
+          <a:fontRef idx="minor">
+            <a:schemeClr val="lt1"/>
+          </a:fontRef>
+        </p:style>
+        <p:txBody>
+          <a:bodyPr rtlCol="0" anchor="ctr"/>
+          <a:lstStyle/>
+          <a:p>
+            <a:pPr algn="ctr"/>
+            <a:r>
+              <a:rPr lang="en-US" dirty="0"/>
+              <a:t>Small illustration</a:t>
+            </a:r>
+          </a:p>
+        </p:txBody>
+      </p:sp>
+      <p:sp>
+        <p:nvSpPr>
+          <p:cNvPr id="31" name="Rectangle 30">
+            <a:extLst>
+              <a:ext uri="{FF2B5EF4-FFF2-40B4-BE49-F238E27FC236}">
+                <a16:creationId xmlns:a16="http://schemas.microsoft.com/office/drawing/2014/main" id="{C029F433-C8C6-CBAC-1976-924646C2A798}"/>
+              </a:ext>
+            </a:extLst>
+          </p:cNvPr>
+          <p:cNvSpPr/>
+          <p:nvPr/>
+        </p:nvSpPr>
+        <p:spPr>
+          <a:xfrm>
+            <a:off x="5492541" y="3132772"/>
+            <a:ext cx="2387600" cy="1208564"/>
+          </a:xfrm>
+          <a:prstGeom prst="rect">
+            <a:avLst/>
+          </a:prstGeom>
+        </p:spPr>
+        <p:style>
+          <a:lnRef idx="2">
+            <a:schemeClr val="accent1">
+              <a:shade val="15000"/>
+            </a:schemeClr>
+          </a:lnRef>
+          <a:fillRef idx="1">
+            <a:schemeClr val="accent1"/>
+          </a:fillRef>
+          <a:effectRef idx="0">
+            <a:schemeClr val="accent1"/>
+          </a:effectRef>
+          <a:fontRef idx="minor">
+            <a:schemeClr val="lt1"/>
+          </a:fontRef>
+        </p:style>
+        <p:txBody>
+          <a:bodyPr rtlCol="0" anchor="ctr"/>
+          <a:lstStyle/>
+          <a:p>
+            <a:pPr algn="ctr"/>
+            <a:r>
+              <a:rPr lang="en-US" dirty="0"/>
+              <a:t>Small illustration</a:t>
+            </a:r>
+          </a:p>
+        </p:txBody>
+      </p:sp>
+      <p:sp>
+        <p:nvSpPr>
+          <p:cNvPr id="32" name="Rectangle 31">
+            <a:extLst>
+              <a:ext uri="{FF2B5EF4-FFF2-40B4-BE49-F238E27FC236}">
+                <a16:creationId xmlns:a16="http://schemas.microsoft.com/office/drawing/2014/main" id="{8577638D-7065-70E1-37AD-62441767E4E4}"/>
+              </a:ext>
+            </a:extLst>
+          </p:cNvPr>
+          <p:cNvSpPr/>
+          <p:nvPr/>
+        </p:nvSpPr>
+        <p:spPr>
+          <a:xfrm>
+            <a:off x="256952" y="221218"/>
+            <a:ext cx="2387600" cy="2565400"/>
+          </a:xfrm>
+          <a:prstGeom prst="rect">
+            <a:avLst/>
+          </a:prstGeom>
+        </p:spPr>
+        <p:style>
+          <a:lnRef idx="2">
+            <a:schemeClr val="accent1">
+              <a:shade val="15000"/>
+            </a:schemeClr>
+          </a:lnRef>
+          <a:fillRef idx="1">
+            <a:schemeClr val="accent1"/>
+          </a:fillRef>
+          <a:effectRef idx="0">
+            <a:schemeClr val="accent1"/>
+          </a:effectRef>
+          <a:fontRef idx="minor">
+            <a:schemeClr val="lt1"/>
+          </a:fontRef>
+        </p:style>
+        <p:txBody>
+          <a:bodyPr rtlCol="0" anchor="ctr"/>
+          <a:lstStyle/>
+          <a:p>
+            <a:pPr algn="ctr"/>
+            <a:r>
+              <a:rPr lang="en-US" dirty="0"/>
+              <a:t>Activation profile</a:t>
+            </a:r>
+          </a:p>
+        </p:txBody>
+      </p:sp>
+    </p:spTree>
+    <p:extLst>
+      <p:ext uri="{BB962C8B-B14F-4D97-AF65-F5344CB8AC3E}">
+        <p14:creationId xmlns:p14="http://schemas.microsoft.com/office/powerpoint/2010/main" val="3428973971"/>
+      </p:ext>
+    </p:extLst>
+  </p:cSld>
+  <p:clrMapOvr>
+    <a:masterClrMapping/>
+  </p:clrMapOvr>
+</p:sld>
+</file>
+
+<file path=ppt/slides/slide3.xml><?xml version="1.0" encoding="utf-8"?>
+<p:sld xmlns:a="http://schemas.openxmlformats.org/drawingml/2006/main" xmlns:r="http://schemas.openxmlformats.org/officeDocument/2006/relationships" xmlns:p="http://schemas.openxmlformats.org/presentationml/2006/main">
+  <p:cSld>
+    <p:spTree>
+      <p:nvGrpSpPr>
+        <p:cNvPr id="1" name=""/>
+        <p:cNvGrpSpPr/>
+        <p:nvPr/>
+      </p:nvGrpSpPr>
+      <p:grpSpPr>
+        <a:xfrm>
+          <a:off x="0" y="0"/>
+          <a:ext cx="0" cy="0"/>
+          <a:chOff x="0" y="0"/>
+          <a:chExt cx="0" cy="0"/>
+        </a:xfrm>
+      </p:grpSpPr>
+      <p:sp>
+        <p:nvSpPr>
           <p:cNvPr id="4" name="TextBox 3">
             <a:extLst>
               <a:ext uri="{FF2B5EF4-FFF2-40B4-BE49-F238E27FC236}">

</xml_diff>

<commit_message>
add extrinsic muscle additional stiffness
</commit_message>
<xml_diff>
--- a/output/MATLAB_scripts/results/results.pptx
+++ b/output/MATLAB_scripts/results/results.pptx
@@ -4709,10 +4709,10 @@
       </p:grpSpPr>
       <p:sp>
         <p:nvSpPr>
-          <p:cNvPr id="5" name="Rectangle 4">
-            <a:extLst>
-              <a:ext uri="{FF2B5EF4-FFF2-40B4-BE49-F238E27FC236}">
-                <a16:creationId xmlns:a16="http://schemas.microsoft.com/office/drawing/2014/main" id="{6FE2403B-8A30-B4CD-4CE8-BDA2EED53956}"/>
+          <p:cNvPr id="29" name="Rectangle 28">
+            <a:extLst>
+              <a:ext uri="{FF2B5EF4-FFF2-40B4-BE49-F238E27FC236}">
+                <a16:creationId xmlns:a16="http://schemas.microsoft.com/office/drawing/2014/main" id="{C7F9C191-06B3-72B3-2C65-6F7B4BDAD98C}"/>
               </a:ext>
             </a:extLst>
           </p:cNvPr>
@@ -4721,8 +4721,8 @@
         </p:nvSpPr>
         <p:spPr>
           <a:xfrm>
-            <a:off x="2966225" y="233918"/>
-            <a:ext cx="3136900" cy="2565400"/>
+            <a:off x="349136" y="2426654"/>
+            <a:ext cx="2387600" cy="1208564"/>
           </a:xfrm>
           <a:prstGeom prst="rect">
             <a:avLst/>
@@ -4751,24 +4751,17 @@
             <a:pPr algn="ctr"/>
             <a:r>
               <a:rPr lang="en-US" dirty="0"/>
-              <a:t>ISM length</a:t>
-            </a:r>
-          </a:p>
-          <a:p>
-            <a:pPr algn="ctr"/>
-            <a:r>
-              <a:rPr lang="en-US" dirty="0"/>
-              <a:t>Force components</a:t>
-            </a:r>
-          </a:p>
-        </p:txBody>
-      </p:sp>
-      <p:sp>
-        <p:nvSpPr>
-          <p:cNvPr id="6" name="Rectangle 5">
-            <a:extLst>
-              <a:ext uri="{FF2B5EF4-FFF2-40B4-BE49-F238E27FC236}">
-                <a16:creationId xmlns:a16="http://schemas.microsoft.com/office/drawing/2014/main" id="{2DD46785-5DD2-16D3-AE56-DB2F24509E90}"/>
+              <a:t>Small illustration</a:t>
+            </a:r>
+          </a:p>
+        </p:txBody>
+      </p:sp>
+      <p:sp>
+        <p:nvSpPr>
+          <p:cNvPr id="30" name="Rectangle 29">
+            <a:extLst>
+              <a:ext uri="{FF2B5EF4-FFF2-40B4-BE49-F238E27FC236}">
+                <a16:creationId xmlns:a16="http://schemas.microsoft.com/office/drawing/2014/main" id="{943DF5C7-6283-F173-7962-C9A3B7829C02}"/>
               </a:ext>
             </a:extLst>
           </p:cNvPr>
@@ -4777,8 +4770,8 @@
         </p:nvSpPr>
         <p:spPr>
           <a:xfrm>
-            <a:off x="259157" y="4597400"/>
-            <a:ext cx="2387600" cy="774700"/>
+            <a:off x="2916740" y="2439354"/>
+            <a:ext cx="2387600" cy="1208564"/>
           </a:xfrm>
           <a:prstGeom prst="rect">
             <a:avLst/>
@@ -4807,17 +4800,17 @@
             <a:pPr algn="ctr"/>
             <a:r>
               <a:rPr lang="en-US" dirty="0"/>
-              <a:t>ISM length</a:t>
-            </a:r>
-          </a:p>
-        </p:txBody>
-      </p:sp>
-      <p:sp>
-        <p:nvSpPr>
-          <p:cNvPr id="7" name="Rectangle 6">
-            <a:extLst>
-              <a:ext uri="{FF2B5EF4-FFF2-40B4-BE49-F238E27FC236}">
-                <a16:creationId xmlns:a16="http://schemas.microsoft.com/office/drawing/2014/main" id="{4EF4F6BA-2F2F-D704-74E1-AC1E53BDECAC}"/>
+              <a:t>Small illustration</a:t>
+            </a:r>
+          </a:p>
+        </p:txBody>
+      </p:sp>
+      <p:sp>
+        <p:nvSpPr>
+          <p:cNvPr id="31" name="Rectangle 30">
+            <a:extLst>
+              <a:ext uri="{FF2B5EF4-FFF2-40B4-BE49-F238E27FC236}">
+                <a16:creationId xmlns:a16="http://schemas.microsoft.com/office/drawing/2014/main" id="{C029F433-C8C6-CBAC-1976-924646C2A798}"/>
               </a:ext>
             </a:extLst>
           </p:cNvPr>
@@ -4826,8 +4819,8 @@
         </p:nvSpPr>
         <p:spPr>
           <a:xfrm>
-            <a:off x="259157" y="5537200"/>
-            <a:ext cx="2387600" cy="774700"/>
+            <a:off x="5584725" y="2443640"/>
+            <a:ext cx="2387600" cy="1208564"/>
           </a:xfrm>
           <a:prstGeom prst="rect">
             <a:avLst/>
@@ -4856,507 +4849,17 @@
             <a:pPr algn="ctr"/>
             <a:r>
               <a:rPr lang="en-US" dirty="0"/>
-              <a:t>C2 top XYZ</a:t>
-            </a:r>
-          </a:p>
-        </p:txBody>
-      </p:sp>
-      <p:sp>
-        <p:nvSpPr>
-          <p:cNvPr id="8" name="Rectangle 7">
-            <a:extLst>
-              <a:ext uri="{FF2B5EF4-FFF2-40B4-BE49-F238E27FC236}">
-                <a16:creationId xmlns:a16="http://schemas.microsoft.com/office/drawing/2014/main" id="{1A1E933B-577A-006D-24F4-FB641ED16AE2}"/>
-              </a:ext>
-            </a:extLst>
-          </p:cNvPr>
-          <p:cNvSpPr/>
-          <p:nvPr/>
-        </p:nvSpPr>
-        <p:spPr>
-          <a:xfrm>
-            <a:off x="259157" y="6477000"/>
-            <a:ext cx="2387600" cy="774700"/>
-          </a:xfrm>
-          <a:prstGeom prst="rect">
-            <a:avLst/>
-          </a:prstGeom>
-        </p:spPr>
-        <p:style>
-          <a:lnRef idx="2">
-            <a:schemeClr val="accent1">
-              <a:shade val="15000"/>
-            </a:schemeClr>
-          </a:lnRef>
-          <a:fillRef idx="1">
-            <a:schemeClr val="accent1"/>
-          </a:fillRef>
-          <a:effectRef idx="0">
-            <a:schemeClr val="accent1"/>
-          </a:effectRef>
-          <a:fontRef idx="minor">
-            <a:schemeClr val="lt1"/>
-          </a:fontRef>
-        </p:style>
-        <p:txBody>
-          <a:bodyPr rtlCol="0" anchor="ctr"/>
-          <a:lstStyle/>
-          <a:p>
-            <a:pPr algn="ctr"/>
-            <a:r>
-              <a:rPr lang="en-US" dirty="0"/>
-              <a:t>C2 angles</a:t>
-            </a:r>
-          </a:p>
-        </p:txBody>
-      </p:sp>
-      <p:sp>
-        <p:nvSpPr>
-          <p:cNvPr id="9" name="Rectangle 8">
-            <a:extLst>
-              <a:ext uri="{FF2B5EF4-FFF2-40B4-BE49-F238E27FC236}">
-                <a16:creationId xmlns:a16="http://schemas.microsoft.com/office/drawing/2014/main" id="{30E698C6-95B8-6E5D-02AC-F51EF40402A3}"/>
-              </a:ext>
-            </a:extLst>
-          </p:cNvPr>
-          <p:cNvSpPr/>
-          <p:nvPr/>
-        </p:nvSpPr>
-        <p:spPr>
-          <a:xfrm>
-            <a:off x="2824557" y="4584700"/>
-            <a:ext cx="2387600" cy="774700"/>
-          </a:xfrm>
-          <a:prstGeom prst="rect">
-            <a:avLst/>
-          </a:prstGeom>
-        </p:spPr>
-        <p:style>
-          <a:lnRef idx="2">
-            <a:schemeClr val="accent1">
-              <a:shade val="15000"/>
-            </a:schemeClr>
-          </a:lnRef>
-          <a:fillRef idx="1">
-            <a:schemeClr val="accent1"/>
-          </a:fillRef>
-          <a:effectRef idx="0">
-            <a:schemeClr val="accent1"/>
-          </a:effectRef>
-          <a:fontRef idx="minor">
-            <a:schemeClr val="lt1"/>
-          </a:fontRef>
-        </p:style>
-        <p:txBody>
-          <a:bodyPr rtlCol="0" anchor="ctr"/>
-          <a:lstStyle/>
-          <a:p>
-            <a:pPr algn="ctr"/>
-            <a:r>
-              <a:rPr lang="en-US" dirty="0"/>
-              <a:t>ISM length</a:t>
-            </a:r>
-          </a:p>
-        </p:txBody>
-      </p:sp>
-      <p:sp>
-        <p:nvSpPr>
-          <p:cNvPr id="10" name="Rectangle 9">
-            <a:extLst>
-              <a:ext uri="{FF2B5EF4-FFF2-40B4-BE49-F238E27FC236}">
-                <a16:creationId xmlns:a16="http://schemas.microsoft.com/office/drawing/2014/main" id="{86BDE638-B68B-990A-9342-119491030035}"/>
-              </a:ext>
-            </a:extLst>
-          </p:cNvPr>
-          <p:cNvSpPr/>
-          <p:nvPr/>
-        </p:nvSpPr>
-        <p:spPr>
-          <a:xfrm>
-            <a:off x="2824557" y="5524500"/>
-            <a:ext cx="2387600" cy="774700"/>
-          </a:xfrm>
-          <a:prstGeom prst="rect">
-            <a:avLst/>
-          </a:prstGeom>
-        </p:spPr>
-        <p:style>
-          <a:lnRef idx="2">
-            <a:schemeClr val="accent1">
-              <a:shade val="15000"/>
-            </a:schemeClr>
-          </a:lnRef>
-          <a:fillRef idx="1">
-            <a:schemeClr val="accent1"/>
-          </a:fillRef>
-          <a:effectRef idx="0">
-            <a:schemeClr val="accent1"/>
-          </a:effectRef>
-          <a:fontRef idx="minor">
-            <a:schemeClr val="lt1"/>
-          </a:fontRef>
-        </p:style>
-        <p:txBody>
-          <a:bodyPr rtlCol="0" anchor="ctr"/>
-          <a:lstStyle/>
-          <a:p>
-            <a:pPr algn="ctr"/>
-            <a:r>
-              <a:rPr lang="en-US" dirty="0"/>
-              <a:t>C2 top XYZ</a:t>
-            </a:r>
-          </a:p>
-        </p:txBody>
-      </p:sp>
-      <p:sp>
-        <p:nvSpPr>
-          <p:cNvPr id="11" name="Rectangle 10">
-            <a:extLst>
-              <a:ext uri="{FF2B5EF4-FFF2-40B4-BE49-F238E27FC236}">
-                <a16:creationId xmlns:a16="http://schemas.microsoft.com/office/drawing/2014/main" id="{09AE9193-9AA4-1D0B-F47C-CED2D6ADA1C1}"/>
-              </a:ext>
-            </a:extLst>
-          </p:cNvPr>
-          <p:cNvSpPr/>
-          <p:nvPr/>
-        </p:nvSpPr>
-        <p:spPr>
-          <a:xfrm>
-            <a:off x="2824557" y="6464300"/>
-            <a:ext cx="2387600" cy="774700"/>
-          </a:xfrm>
-          <a:prstGeom prst="rect">
-            <a:avLst/>
-          </a:prstGeom>
-        </p:spPr>
-        <p:style>
-          <a:lnRef idx="2">
-            <a:schemeClr val="accent1">
-              <a:shade val="15000"/>
-            </a:schemeClr>
-          </a:lnRef>
-          <a:fillRef idx="1">
-            <a:schemeClr val="accent1"/>
-          </a:fillRef>
-          <a:effectRef idx="0">
-            <a:schemeClr val="accent1"/>
-          </a:effectRef>
-          <a:fontRef idx="minor">
-            <a:schemeClr val="lt1"/>
-          </a:fontRef>
-        </p:style>
-        <p:txBody>
-          <a:bodyPr rtlCol="0" anchor="ctr"/>
-          <a:lstStyle/>
-          <a:p>
-            <a:pPr algn="ctr"/>
-            <a:r>
-              <a:rPr lang="en-US" dirty="0"/>
-              <a:t>C2 angles</a:t>
-            </a:r>
-          </a:p>
-        </p:txBody>
-      </p:sp>
-      <p:sp>
-        <p:nvSpPr>
-          <p:cNvPr id="15" name="Rectangle 14">
-            <a:extLst>
-              <a:ext uri="{FF2B5EF4-FFF2-40B4-BE49-F238E27FC236}">
-                <a16:creationId xmlns:a16="http://schemas.microsoft.com/office/drawing/2014/main" id="{7C03963E-0484-4F3C-AE94-DCE42773AE19}"/>
-              </a:ext>
-            </a:extLst>
-          </p:cNvPr>
-          <p:cNvSpPr/>
-          <p:nvPr/>
-        </p:nvSpPr>
-        <p:spPr>
-          <a:xfrm>
-            <a:off x="5466157" y="4597400"/>
-            <a:ext cx="2387600" cy="774700"/>
-          </a:xfrm>
-          <a:prstGeom prst="rect">
-            <a:avLst/>
-          </a:prstGeom>
-        </p:spPr>
-        <p:style>
-          <a:lnRef idx="2">
-            <a:schemeClr val="accent1">
-              <a:shade val="15000"/>
-            </a:schemeClr>
-          </a:lnRef>
-          <a:fillRef idx="1">
-            <a:schemeClr val="accent1"/>
-          </a:fillRef>
-          <a:effectRef idx="0">
-            <a:schemeClr val="accent1"/>
-          </a:effectRef>
-          <a:fontRef idx="minor">
-            <a:schemeClr val="lt1"/>
-          </a:fontRef>
-        </p:style>
-        <p:txBody>
-          <a:bodyPr rtlCol="0" anchor="ctr"/>
-          <a:lstStyle/>
-          <a:p>
-            <a:pPr algn="ctr"/>
-            <a:r>
-              <a:rPr lang="en-US" dirty="0"/>
-              <a:t>ISM length</a:t>
-            </a:r>
-          </a:p>
-        </p:txBody>
-      </p:sp>
-      <p:sp>
-        <p:nvSpPr>
-          <p:cNvPr id="16" name="Rectangle 15">
-            <a:extLst>
-              <a:ext uri="{FF2B5EF4-FFF2-40B4-BE49-F238E27FC236}">
-                <a16:creationId xmlns:a16="http://schemas.microsoft.com/office/drawing/2014/main" id="{1F6A39A7-B8D4-60B5-0AE3-A986A7AB00BF}"/>
-              </a:ext>
-            </a:extLst>
-          </p:cNvPr>
-          <p:cNvSpPr/>
-          <p:nvPr/>
-        </p:nvSpPr>
-        <p:spPr>
-          <a:xfrm>
-            <a:off x="5466157" y="5537200"/>
-            <a:ext cx="2387600" cy="774700"/>
-          </a:xfrm>
-          <a:prstGeom prst="rect">
-            <a:avLst/>
-          </a:prstGeom>
-        </p:spPr>
-        <p:style>
-          <a:lnRef idx="2">
-            <a:schemeClr val="accent1">
-              <a:shade val="15000"/>
-            </a:schemeClr>
-          </a:lnRef>
-          <a:fillRef idx="1">
-            <a:schemeClr val="accent1"/>
-          </a:fillRef>
-          <a:effectRef idx="0">
-            <a:schemeClr val="accent1"/>
-          </a:effectRef>
-          <a:fontRef idx="minor">
-            <a:schemeClr val="lt1"/>
-          </a:fontRef>
-        </p:style>
-        <p:txBody>
-          <a:bodyPr rtlCol="0" anchor="ctr"/>
-          <a:lstStyle/>
-          <a:p>
-            <a:pPr algn="ctr"/>
-            <a:r>
-              <a:rPr lang="en-US" dirty="0"/>
-              <a:t>C2 top XYZ</a:t>
-            </a:r>
-          </a:p>
-        </p:txBody>
-      </p:sp>
-      <p:sp>
-        <p:nvSpPr>
-          <p:cNvPr id="17" name="Rectangle 16">
-            <a:extLst>
-              <a:ext uri="{FF2B5EF4-FFF2-40B4-BE49-F238E27FC236}">
-                <a16:creationId xmlns:a16="http://schemas.microsoft.com/office/drawing/2014/main" id="{0F3219E2-93B0-12FA-95ED-A0FA7869E1E7}"/>
-              </a:ext>
-            </a:extLst>
-          </p:cNvPr>
-          <p:cNvSpPr/>
-          <p:nvPr/>
-        </p:nvSpPr>
-        <p:spPr>
-          <a:xfrm>
-            <a:off x="5466157" y="6477000"/>
-            <a:ext cx="2387600" cy="774700"/>
-          </a:xfrm>
-          <a:prstGeom prst="rect">
-            <a:avLst/>
-          </a:prstGeom>
-        </p:spPr>
-        <p:style>
-          <a:lnRef idx="2">
-            <a:schemeClr val="accent1">
-              <a:shade val="15000"/>
-            </a:schemeClr>
-          </a:lnRef>
-          <a:fillRef idx="1">
-            <a:schemeClr val="accent1"/>
-          </a:fillRef>
-          <a:effectRef idx="0">
-            <a:schemeClr val="accent1"/>
-          </a:effectRef>
-          <a:fontRef idx="minor">
-            <a:schemeClr val="lt1"/>
-          </a:fontRef>
-        </p:style>
-        <p:txBody>
-          <a:bodyPr rtlCol="0" anchor="ctr"/>
-          <a:lstStyle/>
-          <a:p>
-            <a:pPr algn="ctr"/>
-            <a:r>
-              <a:rPr lang="en-US" dirty="0"/>
-              <a:t>C2 angles</a:t>
-            </a:r>
-          </a:p>
-        </p:txBody>
-      </p:sp>
-      <p:sp>
-        <p:nvSpPr>
-          <p:cNvPr id="18" name="Rectangle 17">
-            <a:extLst>
-              <a:ext uri="{FF2B5EF4-FFF2-40B4-BE49-F238E27FC236}">
-                <a16:creationId xmlns:a16="http://schemas.microsoft.com/office/drawing/2014/main" id="{AE0C3B8B-B8B2-981F-D025-10424B495DEE}"/>
-              </a:ext>
-            </a:extLst>
-          </p:cNvPr>
-          <p:cNvSpPr/>
-          <p:nvPr/>
-        </p:nvSpPr>
-        <p:spPr>
-          <a:xfrm>
-            <a:off x="256952" y="7829550"/>
-            <a:ext cx="2387600" cy="774700"/>
-          </a:xfrm>
-          <a:prstGeom prst="rect">
-            <a:avLst/>
-          </a:prstGeom>
-        </p:spPr>
-        <p:style>
-          <a:lnRef idx="2">
-            <a:schemeClr val="accent1">
-              <a:shade val="15000"/>
-            </a:schemeClr>
-          </a:lnRef>
-          <a:fillRef idx="1">
-            <a:schemeClr val="accent1"/>
-          </a:fillRef>
-          <a:effectRef idx="0">
-            <a:schemeClr val="accent1"/>
-          </a:effectRef>
-          <a:fontRef idx="minor">
-            <a:schemeClr val="lt1"/>
-          </a:fontRef>
-        </p:style>
-        <p:txBody>
-          <a:bodyPr rtlCol="0" anchor="ctr"/>
-          <a:lstStyle/>
-          <a:p>
-            <a:pPr algn="ctr"/>
-            <a:r>
-              <a:rPr lang="en-US" dirty="0"/>
-              <a:t>ISM length</a:t>
-            </a:r>
-          </a:p>
-        </p:txBody>
-      </p:sp>
-      <p:sp>
-        <p:nvSpPr>
-          <p:cNvPr id="19" name="Rectangle 18">
-            <a:extLst>
-              <a:ext uri="{FF2B5EF4-FFF2-40B4-BE49-F238E27FC236}">
-                <a16:creationId xmlns:a16="http://schemas.microsoft.com/office/drawing/2014/main" id="{44D0A1BE-1FBB-A7E3-F91E-273805FAB85C}"/>
-              </a:ext>
-            </a:extLst>
-          </p:cNvPr>
-          <p:cNvSpPr/>
-          <p:nvPr/>
-        </p:nvSpPr>
-        <p:spPr>
-          <a:xfrm>
-            <a:off x="256952" y="8769350"/>
-            <a:ext cx="2387600" cy="774700"/>
-          </a:xfrm>
-          <a:prstGeom prst="rect">
-            <a:avLst/>
-          </a:prstGeom>
-        </p:spPr>
-        <p:style>
-          <a:lnRef idx="2">
-            <a:schemeClr val="accent1">
-              <a:shade val="15000"/>
-            </a:schemeClr>
-          </a:lnRef>
-          <a:fillRef idx="1">
-            <a:schemeClr val="accent1"/>
-          </a:fillRef>
-          <a:effectRef idx="0">
-            <a:schemeClr val="accent1"/>
-          </a:effectRef>
-          <a:fontRef idx="minor">
-            <a:schemeClr val="lt1"/>
-          </a:fontRef>
-        </p:style>
-        <p:txBody>
-          <a:bodyPr rtlCol="0" anchor="ctr"/>
-          <a:lstStyle/>
-          <a:p>
-            <a:pPr algn="ctr"/>
-            <a:r>
-              <a:rPr lang="en-US" dirty="0"/>
-              <a:t>C2 top XYZ</a:t>
-            </a:r>
-          </a:p>
-        </p:txBody>
-      </p:sp>
-      <p:sp>
-        <p:nvSpPr>
-          <p:cNvPr id="20" name="Rectangle 19">
-            <a:extLst>
-              <a:ext uri="{FF2B5EF4-FFF2-40B4-BE49-F238E27FC236}">
-                <a16:creationId xmlns:a16="http://schemas.microsoft.com/office/drawing/2014/main" id="{9FC9B00E-CE89-1B51-29F3-B6700D0A12BF}"/>
-              </a:ext>
-            </a:extLst>
-          </p:cNvPr>
-          <p:cNvSpPr/>
-          <p:nvPr/>
-        </p:nvSpPr>
-        <p:spPr>
-          <a:xfrm>
-            <a:off x="256952" y="9709150"/>
-            <a:ext cx="2387600" cy="774700"/>
-          </a:xfrm>
-          <a:prstGeom prst="rect">
-            <a:avLst/>
-          </a:prstGeom>
-        </p:spPr>
-        <p:style>
-          <a:lnRef idx="2">
-            <a:schemeClr val="accent1">
-              <a:shade val="15000"/>
-            </a:schemeClr>
-          </a:lnRef>
-          <a:fillRef idx="1">
-            <a:schemeClr val="accent1"/>
-          </a:fillRef>
-          <a:effectRef idx="0">
-            <a:schemeClr val="accent1"/>
-          </a:effectRef>
-          <a:fontRef idx="minor">
-            <a:schemeClr val="lt1"/>
-          </a:fontRef>
-        </p:style>
-        <p:txBody>
-          <a:bodyPr rtlCol="0" anchor="ctr"/>
-          <a:lstStyle/>
-          <a:p>
-            <a:pPr algn="ctr"/>
-            <a:r>
-              <a:rPr lang="en-US" dirty="0"/>
-              <a:t>C2 angles</a:t>
-            </a:r>
-          </a:p>
-        </p:txBody>
-      </p:sp>
-      <p:sp>
-        <p:nvSpPr>
-          <p:cNvPr id="21" name="TextBox 20">
-            <a:extLst>
-              <a:ext uri="{FF2B5EF4-FFF2-40B4-BE49-F238E27FC236}">
-                <a16:creationId xmlns:a16="http://schemas.microsoft.com/office/drawing/2014/main" id="{6E272F5E-4357-B697-310E-03AE3A1CBBAC}"/>
+              <a:t>Small illustration</a:t>
+            </a:r>
+          </a:p>
+        </p:txBody>
+      </p:sp>
+      <p:sp>
+        <p:nvSpPr>
+          <p:cNvPr id="13" name="TextBox 12">
+            <a:extLst>
+              <a:ext uri="{FF2B5EF4-FFF2-40B4-BE49-F238E27FC236}">
+                <a16:creationId xmlns:a16="http://schemas.microsoft.com/office/drawing/2014/main" id="{599B6204-5CBD-56C4-7B44-7F85F21534EA}"/>
               </a:ext>
             </a:extLst>
           </p:cNvPr>
@@ -5365,8 +4868,8 @@
         </p:nvSpPr>
         <p:spPr>
           <a:xfrm>
-            <a:off x="953461" y="4330184"/>
-            <a:ext cx="998991" cy="369332"/>
+            <a:off x="71645" y="54155"/>
+            <a:ext cx="370614" cy="461665"/>
           </a:xfrm>
           <a:prstGeom prst="rect">
             <a:avLst/>
@@ -5380,18 +4883,18 @@
           <a:lstStyle/>
           <a:p>
             <a:r>
-              <a:rPr lang="en-US" dirty="0"/>
-              <a:t>ISM only</a:t>
-            </a:r>
-          </a:p>
-        </p:txBody>
-      </p:sp>
-      <p:sp>
-        <p:nvSpPr>
-          <p:cNvPr id="22" name="TextBox 21">
-            <a:extLst>
-              <a:ext uri="{FF2B5EF4-FFF2-40B4-BE49-F238E27FC236}">
-                <a16:creationId xmlns:a16="http://schemas.microsoft.com/office/drawing/2014/main" id="{CB006CD7-A242-CF48-BE5C-02BC1F11626A}"/>
+              <a:rPr lang="en-US" sz="2400" b="1" dirty="0"/>
+              <a:t>A</a:t>
+            </a:r>
+          </a:p>
+        </p:txBody>
+      </p:sp>
+      <p:sp>
+        <p:nvSpPr>
+          <p:cNvPr id="14" name="TextBox 13">
+            <a:extLst>
+              <a:ext uri="{FF2B5EF4-FFF2-40B4-BE49-F238E27FC236}">
+                <a16:creationId xmlns:a16="http://schemas.microsoft.com/office/drawing/2014/main" id="{70C4244A-A372-8EDB-7B0A-3368D5335BBE}"/>
               </a:ext>
             </a:extLst>
           </p:cNvPr>
@@ -5400,8 +4903,8 @@
         </p:nvSpPr>
         <p:spPr>
           <a:xfrm>
-            <a:off x="3499625" y="4316968"/>
-            <a:ext cx="1037463" cy="369332"/>
+            <a:off x="71645" y="1086210"/>
+            <a:ext cx="370614" cy="461665"/>
           </a:xfrm>
           <a:prstGeom prst="rect">
             <a:avLst/>
@@ -5415,18 +4918,126 @@
           <a:lstStyle/>
           <a:p>
             <a:r>
-              <a:rPr lang="en-US" dirty="0"/>
-              <a:t>N M only</a:t>
-            </a:r>
-          </a:p>
-        </p:txBody>
-      </p:sp>
-      <p:sp>
-        <p:nvSpPr>
-          <p:cNvPr id="23" name="TextBox 22">
-            <a:extLst>
-              <a:ext uri="{FF2B5EF4-FFF2-40B4-BE49-F238E27FC236}">
-                <a16:creationId xmlns:a16="http://schemas.microsoft.com/office/drawing/2014/main" id="{EB9B8E11-8E7D-492A-9CA0-6298C93D62A0}"/>
+              <a:rPr lang="en-US" sz="2400" b="1" dirty="0"/>
+              <a:t>B</a:t>
+            </a:r>
+          </a:p>
+        </p:txBody>
+      </p:sp>
+      <p:pic>
+        <p:nvPicPr>
+          <p:cNvPr id="34" name="Picture 33" descr="A graph with numbers and lines&#10;&#10;Description automatically generated">
+            <a:extLst>
+              <a:ext uri="{FF2B5EF4-FFF2-40B4-BE49-F238E27FC236}">
+                <a16:creationId xmlns:a16="http://schemas.microsoft.com/office/drawing/2014/main" id="{4AD8D05B-8449-F9A8-3E10-55134DB6DB70}"/>
+              </a:ext>
+            </a:extLst>
+          </p:cNvPr>
+          <p:cNvPicPr>
+            <a:picLocks noChangeAspect="1"/>
+          </p:cNvPicPr>
+          <p:nvPr/>
+        </p:nvPicPr>
+        <p:blipFill>
+          <a:blip r:embed="rId2">
+            <a:extLst>
+              <a:ext uri="{28A0092B-C50C-407E-A947-70E740481C1C}">
+                <a14:useLocalDpi xmlns:a14="http://schemas.microsoft.com/office/drawing/2010/main" val="0"/>
+              </a:ext>
+            </a:extLst>
+          </a:blip>
+          <a:stretch>
+            <a:fillRect/>
+          </a:stretch>
+        </p:blipFill>
+        <p:spPr>
+          <a:xfrm>
+            <a:off x="393871" y="229541"/>
+            <a:ext cx="1429512" cy="950976"/>
+          </a:xfrm>
+          <a:prstGeom prst="rect">
+            <a:avLst/>
+          </a:prstGeom>
+        </p:spPr>
+      </p:pic>
+      <p:pic>
+        <p:nvPicPr>
+          <p:cNvPr id="36" name="Picture 35" descr="A graph of a function&#10;&#10;Description automatically generated">
+            <a:extLst>
+              <a:ext uri="{FF2B5EF4-FFF2-40B4-BE49-F238E27FC236}">
+                <a16:creationId xmlns:a16="http://schemas.microsoft.com/office/drawing/2014/main" id="{0C579A7A-E9BD-A304-17FD-CF78106E5966}"/>
+              </a:ext>
+            </a:extLst>
+          </p:cNvPr>
+          <p:cNvPicPr>
+            <a:picLocks noChangeAspect="1"/>
+          </p:cNvPicPr>
+          <p:nvPr/>
+        </p:nvPicPr>
+        <p:blipFill>
+          <a:blip r:embed="rId3">
+            <a:extLst>
+              <a:ext uri="{28A0092B-C50C-407E-A947-70E740481C1C}">
+                <a14:useLocalDpi xmlns:a14="http://schemas.microsoft.com/office/drawing/2010/main" val="0"/>
+              </a:ext>
+            </a:extLst>
+          </a:blip>
+          <a:stretch>
+            <a:fillRect/>
+          </a:stretch>
+        </p:blipFill>
+        <p:spPr>
+          <a:xfrm>
+            <a:off x="393871" y="1269056"/>
+            <a:ext cx="1429512" cy="950976"/>
+          </a:xfrm>
+          <a:prstGeom prst="rect">
+            <a:avLst/>
+          </a:prstGeom>
+        </p:spPr>
+      </p:pic>
+      <p:pic>
+        <p:nvPicPr>
+          <p:cNvPr id="38" name="Picture 37" descr="A graph of a graph showing a number of different colored lines&#10;&#10;Description automatically generated with medium confidence">
+            <a:extLst>
+              <a:ext uri="{FF2B5EF4-FFF2-40B4-BE49-F238E27FC236}">
+                <a16:creationId xmlns:a16="http://schemas.microsoft.com/office/drawing/2014/main" id="{AB0F0B4F-E7D5-1BF6-1B62-EF0270A86F07}"/>
+              </a:ext>
+            </a:extLst>
+          </p:cNvPr>
+          <p:cNvPicPr>
+            <a:picLocks noChangeAspect="1"/>
+          </p:cNvPicPr>
+          <p:nvPr/>
+        </p:nvPicPr>
+        <p:blipFill>
+          <a:blip r:embed="rId4">
+            <a:extLst>
+              <a:ext uri="{28A0092B-C50C-407E-A947-70E740481C1C}">
+                <a14:useLocalDpi xmlns:a14="http://schemas.microsoft.com/office/drawing/2010/main" val="0"/>
+              </a:ext>
+            </a:extLst>
+          </a:blip>
+          <a:stretch>
+            <a:fillRect/>
+          </a:stretch>
+        </p:blipFill>
+        <p:spPr>
+          <a:xfrm>
+            <a:off x="2070113" y="284987"/>
+            <a:ext cx="2859024" cy="1905000"/>
+          </a:xfrm>
+          <a:prstGeom prst="rect">
+            <a:avLst/>
+          </a:prstGeom>
+        </p:spPr>
+      </p:pic>
+      <p:sp>
+        <p:nvSpPr>
+          <p:cNvPr id="39" name="TextBox 38">
+            <a:extLst>
+              <a:ext uri="{FF2B5EF4-FFF2-40B4-BE49-F238E27FC236}">
+                <a16:creationId xmlns:a16="http://schemas.microsoft.com/office/drawing/2014/main" id="{F27191B3-9B90-8B57-8943-5882A7A278D7}"/>
               </a:ext>
             </a:extLst>
           </p:cNvPr>
@@ -5435,8 +5046,8 @@
         </p:nvSpPr>
         <p:spPr>
           <a:xfrm>
-            <a:off x="6103125" y="4316968"/>
-            <a:ext cx="1301959" cy="369332"/>
+            <a:off x="1721895" y="48320"/>
+            <a:ext cx="348172" cy="461665"/>
           </a:xfrm>
           <a:prstGeom prst="rect">
             <a:avLst/>
@@ -5450,18 +5061,198 @@
           <a:lstStyle/>
           <a:p>
             <a:r>
-              <a:rPr lang="en-US" dirty="0"/>
-              <a:t>PIP PM only</a:t>
-            </a:r>
-          </a:p>
-        </p:txBody>
-      </p:sp>
-      <p:sp>
-        <p:nvSpPr>
-          <p:cNvPr id="24" name="TextBox 23">
-            <a:extLst>
-              <a:ext uri="{FF2B5EF4-FFF2-40B4-BE49-F238E27FC236}">
-                <a16:creationId xmlns:a16="http://schemas.microsoft.com/office/drawing/2014/main" id="{BE27A477-2B14-C6DA-AB14-B68A8BF49B36}"/>
+              <a:rPr lang="en-US" sz="2400" b="1" dirty="0"/>
+              <a:t>C</a:t>
+            </a:r>
+          </a:p>
+        </p:txBody>
+      </p:sp>
+      <p:pic>
+        <p:nvPicPr>
+          <p:cNvPr id="42" name="Picture 41" descr="A screenshot of a graph&#10;&#10;Description automatically generated">
+            <a:extLst>
+              <a:ext uri="{FF2B5EF4-FFF2-40B4-BE49-F238E27FC236}">
+                <a16:creationId xmlns:a16="http://schemas.microsoft.com/office/drawing/2014/main" id="{B122F18D-F8FA-BEEE-BAD6-D43D9B885950}"/>
+              </a:ext>
+            </a:extLst>
+          </p:cNvPr>
+          <p:cNvPicPr>
+            <a:picLocks noChangeAspect="1"/>
+          </p:cNvPicPr>
+          <p:nvPr/>
+        </p:nvPicPr>
+        <p:blipFill>
+          <a:blip r:embed="rId5">
+            <a:extLst>
+              <a:ext uri="{28A0092B-C50C-407E-A947-70E740481C1C}">
+                <a14:useLocalDpi xmlns:a14="http://schemas.microsoft.com/office/drawing/2010/main" val="0"/>
+              </a:ext>
+            </a:extLst>
+          </a:blip>
+          <a:stretch>
+            <a:fillRect/>
+          </a:stretch>
+        </p:blipFill>
+        <p:spPr>
+          <a:xfrm>
+            <a:off x="6082612" y="3647918"/>
+            <a:ext cx="2859024" cy="4764024"/>
+          </a:xfrm>
+          <a:prstGeom prst="rect">
+            <a:avLst/>
+          </a:prstGeom>
+        </p:spPr>
+      </p:pic>
+      <p:pic>
+        <p:nvPicPr>
+          <p:cNvPr id="44" name="Picture 43" descr="A screenshot of a graph&#10;&#10;Description automatically generated">
+            <a:extLst>
+              <a:ext uri="{FF2B5EF4-FFF2-40B4-BE49-F238E27FC236}">
+                <a16:creationId xmlns:a16="http://schemas.microsoft.com/office/drawing/2014/main" id="{8C4EF063-5518-F033-1E9E-ED6FBEDF2683}"/>
+              </a:ext>
+            </a:extLst>
+          </p:cNvPr>
+          <p:cNvPicPr>
+            <a:picLocks noChangeAspect="1"/>
+          </p:cNvPicPr>
+          <p:nvPr/>
+        </p:nvPicPr>
+        <p:blipFill>
+          <a:blip r:embed="rId6">
+            <a:extLst>
+              <a:ext uri="{28A0092B-C50C-407E-A947-70E740481C1C}">
+                <a14:useLocalDpi xmlns:a14="http://schemas.microsoft.com/office/drawing/2010/main" val="0"/>
+              </a:ext>
+            </a:extLst>
+          </a:blip>
+          <a:stretch>
+            <a:fillRect/>
+          </a:stretch>
+        </p:blipFill>
+        <p:spPr>
+          <a:xfrm>
+            <a:off x="3169782" y="3718409"/>
+            <a:ext cx="2859024" cy="4764024"/>
+          </a:xfrm>
+          <a:prstGeom prst="rect">
+            <a:avLst/>
+          </a:prstGeom>
+        </p:spPr>
+      </p:pic>
+      <p:pic>
+        <p:nvPicPr>
+          <p:cNvPr id="46" name="Picture 45" descr="A graph of a function&#10;&#10;Description automatically generated with medium confidence">
+            <a:extLst>
+              <a:ext uri="{FF2B5EF4-FFF2-40B4-BE49-F238E27FC236}">
+                <a16:creationId xmlns:a16="http://schemas.microsoft.com/office/drawing/2014/main" id="{0A30EE15-F137-4CF7-52A2-6D94C0356389}"/>
+              </a:ext>
+            </a:extLst>
+          </p:cNvPr>
+          <p:cNvPicPr>
+            <a:picLocks noChangeAspect="1"/>
+          </p:cNvPicPr>
+          <p:nvPr/>
+        </p:nvPicPr>
+        <p:blipFill>
+          <a:blip r:embed="rId7">
+            <a:extLst>
+              <a:ext uri="{28A0092B-C50C-407E-A947-70E740481C1C}">
+                <a14:useLocalDpi xmlns:a14="http://schemas.microsoft.com/office/drawing/2010/main" val="0"/>
+              </a:ext>
+            </a:extLst>
+          </a:blip>
+          <a:stretch>
+            <a:fillRect/>
+          </a:stretch>
+        </p:blipFill>
+        <p:spPr>
+          <a:xfrm>
+            <a:off x="256952" y="3718409"/>
+            <a:ext cx="2859024" cy="4764024"/>
+          </a:xfrm>
+          <a:prstGeom prst="rect">
+            <a:avLst/>
+          </a:prstGeom>
+        </p:spPr>
+      </p:pic>
+      <p:pic>
+        <p:nvPicPr>
+          <p:cNvPr id="48" name="Picture 47" descr="A graph of a graph of a function&#10;&#10;Description automatically generated with medium confidence">
+            <a:extLst>
+              <a:ext uri="{FF2B5EF4-FFF2-40B4-BE49-F238E27FC236}">
+                <a16:creationId xmlns:a16="http://schemas.microsoft.com/office/drawing/2014/main" id="{C52D767A-C29C-E56B-0E75-8CA53F2E96EC}"/>
+              </a:ext>
+            </a:extLst>
+          </p:cNvPr>
+          <p:cNvPicPr>
+            <a:picLocks noChangeAspect="1"/>
+          </p:cNvPicPr>
+          <p:nvPr/>
+        </p:nvPicPr>
+        <p:blipFill>
+          <a:blip r:embed="rId8">
+            <a:extLst>
+              <a:ext uri="{28A0092B-C50C-407E-A947-70E740481C1C}">
+                <a14:useLocalDpi xmlns:a14="http://schemas.microsoft.com/office/drawing/2010/main" val="0"/>
+              </a:ext>
+            </a:extLst>
+          </a:blip>
+          <a:stretch>
+            <a:fillRect/>
+          </a:stretch>
+        </p:blipFill>
+        <p:spPr>
+          <a:xfrm>
+            <a:off x="3160451" y="8223554"/>
+            <a:ext cx="2859024" cy="4764024"/>
+          </a:xfrm>
+          <a:prstGeom prst="rect">
+            <a:avLst/>
+          </a:prstGeom>
+        </p:spPr>
+      </p:pic>
+      <p:pic>
+        <p:nvPicPr>
+          <p:cNvPr id="50" name="Picture 49" descr="A graph of a function&#10;&#10;Description automatically generated with medium confidence">
+            <a:extLst>
+              <a:ext uri="{FF2B5EF4-FFF2-40B4-BE49-F238E27FC236}">
+                <a16:creationId xmlns:a16="http://schemas.microsoft.com/office/drawing/2014/main" id="{445FFB61-1863-0CDA-5C78-91D1EE9BE6B5}"/>
+              </a:ext>
+            </a:extLst>
+          </p:cNvPr>
+          <p:cNvPicPr>
+            <a:picLocks noChangeAspect="1"/>
+          </p:cNvPicPr>
+          <p:nvPr/>
+        </p:nvPicPr>
+        <p:blipFill>
+          <a:blip r:embed="rId9">
+            <a:extLst>
+              <a:ext uri="{28A0092B-C50C-407E-A947-70E740481C1C}">
+                <a14:useLocalDpi xmlns:a14="http://schemas.microsoft.com/office/drawing/2010/main" val="0"/>
+              </a:ext>
+            </a:extLst>
+          </a:blip>
+          <a:stretch>
+            <a:fillRect/>
+          </a:stretch>
+        </p:blipFill>
+        <p:spPr>
+          <a:xfrm>
+            <a:off x="328848" y="8223554"/>
+            <a:ext cx="2859024" cy="4764024"/>
+          </a:xfrm>
+          <a:prstGeom prst="rect">
+            <a:avLst/>
+          </a:prstGeom>
+        </p:spPr>
+      </p:pic>
+      <p:sp>
+        <p:nvSpPr>
+          <p:cNvPr id="51" name="TextBox 50">
+            <a:extLst>
+              <a:ext uri="{FF2B5EF4-FFF2-40B4-BE49-F238E27FC236}">
+                <a16:creationId xmlns:a16="http://schemas.microsoft.com/office/drawing/2014/main" id="{ACE7704B-2A31-EB00-0F94-D006A06C4BC4}"/>
               </a:ext>
             </a:extLst>
           </p:cNvPr>
@@ -5470,8 +5261,8 @@
         </p:nvSpPr>
         <p:spPr>
           <a:xfrm>
-            <a:off x="693909" y="7560786"/>
-            <a:ext cx="1703736" cy="369332"/>
+            <a:off x="6307307" y="8801100"/>
+            <a:ext cx="4336645" cy="3416320"/>
           </a:xfrm>
           <a:prstGeom prst="rect">
             <a:avLst/>
@@ -5479,392 +5270,89 @@
           <a:noFill/>
         </p:spPr>
         <p:txBody>
-          <a:bodyPr wrap="none" rtlCol="0">
+          <a:bodyPr wrap="square" rtlCol="0">
             <a:spAutoFit/>
           </a:bodyPr>
           <a:lstStyle/>
           <a:p>
             <a:r>
               <a:rPr lang="en-US" dirty="0"/>
-              <a:t>Together in sync</a:t>
-            </a:r>
-          </a:p>
-        </p:txBody>
-      </p:sp>
-      <p:sp>
-        <p:nvSpPr>
-          <p:cNvPr id="25" name="Rectangle 24">
-            <a:extLst>
-              <a:ext uri="{FF2B5EF4-FFF2-40B4-BE49-F238E27FC236}">
-                <a16:creationId xmlns:a16="http://schemas.microsoft.com/office/drawing/2014/main" id="{8D1418BB-6EA8-7FB4-2112-452A41598B4E}"/>
-              </a:ext>
-            </a:extLst>
-          </p:cNvPr>
-          <p:cNvSpPr/>
-          <p:nvPr/>
-        </p:nvSpPr>
-        <p:spPr>
-          <a:xfrm>
-            <a:off x="2824557" y="7829550"/>
-            <a:ext cx="2387600" cy="774700"/>
-          </a:xfrm>
-          <a:prstGeom prst="rect">
-            <a:avLst/>
-          </a:prstGeom>
-        </p:spPr>
-        <p:style>
-          <a:lnRef idx="2">
-            <a:schemeClr val="accent1">
-              <a:shade val="15000"/>
-            </a:schemeClr>
-          </a:lnRef>
-          <a:fillRef idx="1">
-            <a:schemeClr val="accent1"/>
-          </a:fillRef>
-          <a:effectRef idx="0">
-            <a:schemeClr val="accent1"/>
-          </a:effectRef>
-          <a:fontRef idx="minor">
-            <a:schemeClr val="lt1"/>
-          </a:fontRef>
-        </p:style>
-        <p:txBody>
-          <a:bodyPr rtlCol="0" anchor="ctr"/>
-          <a:lstStyle/>
-          <a:p>
-            <a:pPr algn="ctr"/>
+              <a:t>Highlight: </a:t>
+            </a:r>
+          </a:p>
+          <a:p>
+            <a:pPr marL="342900" indent="-342900">
+              <a:buAutoNum type="arabicParenBoth"/>
+            </a:pPr>
             <a:r>
               <a:rPr lang="en-US" dirty="0"/>
-              <a:t>ISM length</a:t>
-            </a:r>
-          </a:p>
-        </p:txBody>
-      </p:sp>
-      <p:sp>
-        <p:nvSpPr>
-          <p:cNvPr id="26" name="Rectangle 25">
-            <a:extLst>
-              <a:ext uri="{FF2B5EF4-FFF2-40B4-BE49-F238E27FC236}">
-                <a16:creationId xmlns:a16="http://schemas.microsoft.com/office/drawing/2014/main" id="{19B2E63B-4A4D-0CFD-B30D-065FA0089BA6}"/>
-              </a:ext>
-            </a:extLst>
-          </p:cNvPr>
-          <p:cNvSpPr/>
-          <p:nvPr/>
-        </p:nvSpPr>
-        <p:spPr>
-          <a:xfrm>
-            <a:off x="2824557" y="8769350"/>
-            <a:ext cx="2387600" cy="774700"/>
-          </a:xfrm>
-          <a:prstGeom prst="rect">
-            <a:avLst/>
-          </a:prstGeom>
-        </p:spPr>
-        <p:style>
-          <a:lnRef idx="2">
-            <a:schemeClr val="accent1">
-              <a:shade val="15000"/>
-            </a:schemeClr>
-          </a:lnRef>
-          <a:fillRef idx="1">
-            <a:schemeClr val="accent1"/>
-          </a:fillRef>
-          <a:effectRef idx="0">
-            <a:schemeClr val="accent1"/>
-          </a:effectRef>
-          <a:fontRef idx="minor">
-            <a:schemeClr val="lt1"/>
-          </a:fontRef>
-        </p:style>
-        <p:txBody>
-          <a:bodyPr rtlCol="0" anchor="ctr"/>
-          <a:lstStyle/>
-          <a:p>
-            <a:pPr algn="ctr"/>
-            <a:r>
+              <a:t>ISM function:</a:t>
+            </a:r>
+            <a:br>
               <a:rPr lang="en-US" dirty="0"/>
-              <a:t>C2 top XYZ</a:t>
-            </a:r>
-          </a:p>
-        </p:txBody>
-      </p:sp>
-      <p:sp>
-        <p:nvSpPr>
-          <p:cNvPr id="27" name="Rectangle 26">
-            <a:extLst>
-              <a:ext uri="{FF2B5EF4-FFF2-40B4-BE49-F238E27FC236}">
-                <a16:creationId xmlns:a16="http://schemas.microsoft.com/office/drawing/2014/main" id="{7BE86450-F1AA-110B-4862-E6AAB0091A25}"/>
-              </a:ext>
-            </a:extLst>
-          </p:cNvPr>
-          <p:cNvSpPr/>
-          <p:nvPr/>
-        </p:nvSpPr>
-        <p:spPr>
-          <a:xfrm>
-            <a:off x="2824557" y="9709150"/>
-            <a:ext cx="2387600" cy="774700"/>
-          </a:xfrm>
-          <a:prstGeom prst="rect">
-            <a:avLst/>
-          </a:prstGeom>
-        </p:spPr>
-        <p:style>
-          <a:lnRef idx="2">
-            <a:schemeClr val="accent1">
-              <a:shade val="15000"/>
-            </a:schemeClr>
-          </a:lnRef>
-          <a:fillRef idx="1">
-            <a:schemeClr val="accent1"/>
-          </a:fillRef>
-          <a:effectRef idx="0">
-            <a:schemeClr val="accent1"/>
-          </a:effectRef>
-          <a:fontRef idx="minor">
-            <a:schemeClr val="lt1"/>
-          </a:fontRef>
-        </p:style>
-        <p:txBody>
-          <a:bodyPr rtlCol="0" anchor="ctr"/>
-          <a:lstStyle/>
-          <a:p>
-            <a:pPr algn="ctr"/>
+            </a:br>
             <a:r>
               <a:rPr lang="en-US" dirty="0"/>
-              <a:t>C2 angles</a:t>
-            </a:r>
-          </a:p>
-        </p:txBody>
-      </p:sp>
-      <p:sp>
-        <p:nvSpPr>
-          <p:cNvPr id="28" name="TextBox 27">
-            <a:extLst>
-              <a:ext uri="{FF2B5EF4-FFF2-40B4-BE49-F238E27FC236}">
-                <a16:creationId xmlns:a16="http://schemas.microsoft.com/office/drawing/2014/main" id="{7DEC1916-6A68-EF66-7115-15B6DF9B96A9}"/>
-              </a:ext>
-            </a:extLst>
-          </p:cNvPr>
-          <p:cNvSpPr txBox="1"/>
-          <p:nvPr/>
-        </p:nvSpPr>
-        <p:spPr>
-          <a:xfrm>
-            <a:off x="3261514" y="7560786"/>
-            <a:ext cx="2094869" cy="369332"/>
-          </a:xfrm>
-          <a:prstGeom prst="rect">
-            <a:avLst/>
-          </a:prstGeom>
-          <a:noFill/>
-        </p:spPr>
-        <p:txBody>
-          <a:bodyPr wrap="none" rtlCol="0">
-            <a:spAutoFit/>
-          </a:bodyPr>
-          <a:lstStyle/>
-          <a:p>
+              <a:t>protract, with small pad movement</a:t>
+            </a:r>
+          </a:p>
+          <a:p>
+            <a:pPr marL="342900" indent="-342900">
+              <a:buAutoNum type="arabicParenBoth"/>
+            </a:pPr>
             <a:r>
               <a:rPr lang="en-US" dirty="0"/>
-              <a:t>Together out of sync</a:t>
-            </a:r>
-          </a:p>
-        </p:txBody>
-      </p:sp>
-      <p:sp>
-        <p:nvSpPr>
-          <p:cNvPr id="29" name="Rectangle 28">
-            <a:extLst>
-              <a:ext uri="{FF2B5EF4-FFF2-40B4-BE49-F238E27FC236}">
-                <a16:creationId xmlns:a16="http://schemas.microsoft.com/office/drawing/2014/main" id="{C7F9C191-06B3-72B3-2C65-6F7B4BDAD98C}"/>
-              </a:ext>
-            </a:extLst>
-          </p:cNvPr>
-          <p:cNvSpPr/>
-          <p:nvPr/>
-        </p:nvSpPr>
-        <p:spPr>
-          <a:xfrm>
-            <a:off x="256952" y="3115786"/>
-            <a:ext cx="2387600" cy="1208564"/>
-          </a:xfrm>
-          <a:prstGeom prst="rect">
-            <a:avLst/>
-          </a:prstGeom>
-        </p:spPr>
-        <p:style>
-          <a:lnRef idx="2">
-            <a:schemeClr val="accent1">
-              <a:shade val="15000"/>
-            </a:schemeClr>
-          </a:lnRef>
-          <a:fillRef idx="1">
-            <a:schemeClr val="accent1"/>
-          </a:fillRef>
-          <a:effectRef idx="0">
-            <a:schemeClr val="accent1"/>
-          </a:effectRef>
-          <a:fontRef idx="minor">
-            <a:schemeClr val="lt1"/>
-          </a:fontRef>
-        </p:style>
-        <p:txBody>
-          <a:bodyPr rtlCol="0" anchor="ctr"/>
-          <a:lstStyle/>
-          <a:p>
-            <a:pPr algn="ctr"/>
-            <a:r>
+              <a:t>PIP/PM function:</a:t>
+            </a:r>
+            <a:br>
               <a:rPr lang="en-US" dirty="0"/>
-              <a:t>Small illustration</a:t>
-            </a:r>
-          </a:p>
-        </p:txBody>
-      </p:sp>
-      <p:sp>
-        <p:nvSpPr>
-          <p:cNvPr id="30" name="Rectangle 29">
-            <a:extLst>
-              <a:ext uri="{FF2B5EF4-FFF2-40B4-BE49-F238E27FC236}">
-                <a16:creationId xmlns:a16="http://schemas.microsoft.com/office/drawing/2014/main" id="{943DF5C7-6283-F173-7962-C9A3B7829C02}"/>
-              </a:ext>
-            </a:extLst>
-          </p:cNvPr>
-          <p:cNvSpPr/>
-          <p:nvPr/>
-        </p:nvSpPr>
-        <p:spPr>
-          <a:xfrm>
-            <a:off x="2824556" y="3128486"/>
-            <a:ext cx="2387600" cy="1208564"/>
-          </a:xfrm>
-          <a:prstGeom prst="rect">
-            <a:avLst/>
-          </a:prstGeom>
-        </p:spPr>
-        <p:style>
-          <a:lnRef idx="2">
-            <a:schemeClr val="accent1">
-              <a:shade val="15000"/>
-            </a:schemeClr>
-          </a:lnRef>
-          <a:fillRef idx="1">
-            <a:schemeClr val="accent1"/>
-          </a:fillRef>
-          <a:effectRef idx="0">
-            <a:schemeClr val="accent1"/>
-          </a:effectRef>
-          <a:fontRef idx="minor">
-            <a:schemeClr val="lt1"/>
-          </a:fontRef>
-        </p:style>
-        <p:txBody>
-          <a:bodyPr rtlCol="0" anchor="ctr"/>
-          <a:lstStyle/>
-          <a:p>
-            <a:pPr algn="ctr"/>
+            </a:br>
             <a:r>
               <a:rPr lang="en-US" dirty="0"/>
-              <a:t>Small illustration</a:t>
-            </a:r>
-          </a:p>
-        </p:txBody>
-      </p:sp>
-      <p:sp>
-        <p:nvSpPr>
-          <p:cNvPr id="31" name="Rectangle 30">
-            <a:extLst>
-              <a:ext uri="{FF2B5EF4-FFF2-40B4-BE49-F238E27FC236}">
-                <a16:creationId xmlns:a16="http://schemas.microsoft.com/office/drawing/2014/main" id="{C029F433-C8C6-CBAC-1976-924646C2A798}"/>
-              </a:ext>
-            </a:extLst>
-          </p:cNvPr>
-          <p:cNvSpPr/>
-          <p:nvPr/>
-        </p:nvSpPr>
-        <p:spPr>
-          <a:xfrm>
-            <a:off x="5492541" y="3132772"/>
-            <a:ext cx="2387600" cy="1208564"/>
-          </a:xfrm>
-          <a:prstGeom prst="rect">
-            <a:avLst/>
-          </a:prstGeom>
-        </p:spPr>
-        <p:style>
-          <a:lnRef idx="2">
-            <a:schemeClr val="accent1">
-              <a:shade val="15000"/>
-            </a:schemeClr>
-          </a:lnRef>
-          <a:fillRef idx="1">
-            <a:schemeClr val="accent1"/>
-          </a:fillRef>
-          <a:effectRef idx="0">
-            <a:schemeClr val="accent1"/>
-          </a:effectRef>
-          <a:fontRef idx="minor">
-            <a:schemeClr val="lt1"/>
-          </a:fontRef>
-        </p:style>
-        <p:txBody>
-          <a:bodyPr rtlCol="0" anchor="ctr"/>
-          <a:lstStyle/>
-          <a:p>
-            <a:pPr algn="ctr"/>
+              <a:t>retract, with small pad movement</a:t>
+            </a:r>
+          </a:p>
+          <a:p>
+            <a:pPr marL="342900" indent="-342900">
+              <a:buAutoNum type="arabicParenBoth"/>
+            </a:pPr>
             <a:r>
               <a:rPr lang="en-US" dirty="0"/>
-              <a:t>Small illustration</a:t>
-            </a:r>
-          </a:p>
-        </p:txBody>
-      </p:sp>
-      <p:sp>
-        <p:nvSpPr>
-          <p:cNvPr id="32" name="Rectangle 31">
-            <a:extLst>
-              <a:ext uri="{FF2B5EF4-FFF2-40B4-BE49-F238E27FC236}">
-                <a16:creationId xmlns:a16="http://schemas.microsoft.com/office/drawing/2014/main" id="{8577638D-7065-70E1-37AD-62441767E4E4}"/>
-              </a:ext>
-            </a:extLst>
-          </p:cNvPr>
-          <p:cNvSpPr/>
-          <p:nvPr/>
-        </p:nvSpPr>
-        <p:spPr>
-          <a:xfrm>
-            <a:off x="256952" y="221218"/>
-            <a:ext cx="2387600" cy="2565400"/>
-          </a:xfrm>
-          <a:prstGeom prst="rect">
-            <a:avLst/>
-          </a:prstGeom>
-        </p:spPr>
-        <p:style>
-          <a:lnRef idx="2">
-            <a:schemeClr val="accent1">
-              <a:shade val="15000"/>
-            </a:schemeClr>
-          </a:lnRef>
-          <a:fillRef idx="1">
-            <a:schemeClr val="accent1"/>
-          </a:fillRef>
-          <a:effectRef idx="0">
-            <a:schemeClr val="accent1"/>
-          </a:effectRef>
-          <a:fontRef idx="minor">
-            <a:schemeClr val="lt1"/>
-          </a:fontRef>
-        </p:style>
-        <p:txBody>
-          <a:bodyPr rtlCol="0" anchor="ctr"/>
-          <a:lstStyle/>
-          <a:p>
-            <a:pPr algn="ctr"/>
-            <a:r>
+              <a:t>N/M function:</a:t>
+            </a:r>
+            <a:br>
               <a:rPr lang="en-US" dirty="0"/>
-              <a:t>Activation profile</a:t>
+            </a:br>
+            <a:r>
+              <a:rPr lang="en-US" dirty="0"/>
+              <a:t>retract, with large pad movement</a:t>
+            </a:r>
+          </a:p>
+          <a:p>
+            <a:pPr marL="342900" indent="-342900">
+              <a:buAutoNum type="arabicParenBoth"/>
+            </a:pPr>
+            <a:r>
+              <a:rPr lang="en-US" dirty="0"/>
+              <a:t>Note: (2) is so much thinner and weaker than (3) but they have comparable function</a:t>
+            </a:r>
+          </a:p>
+          <a:p>
+            <a:pPr marL="342900" indent="-342900">
+              <a:buAutoNum type="arabicParenBoth"/>
+            </a:pPr>
+            <a:r>
+              <a:rPr lang="en-US" dirty="0"/>
+              <a:t>Actuating them together won’t work</a:t>
+            </a:r>
+          </a:p>
+          <a:p>
+            <a:pPr marL="342900" indent="-342900">
+              <a:buAutoNum type="arabicParenBoth"/>
+            </a:pPr>
+            <a:r>
+              <a:rPr lang="en-US" dirty="0"/>
+              <a:t>Asynchronously shows muscle synergy</a:t>
             </a:r>
           </a:p>
         </p:txBody>
@@ -5901,10 +5389,252 @@
       </p:grpSpPr>
       <p:sp>
         <p:nvSpPr>
-          <p:cNvPr id="4" name="TextBox 3">
-            <a:extLst>
-              <a:ext uri="{FF2B5EF4-FFF2-40B4-BE49-F238E27FC236}">
-                <a16:creationId xmlns:a16="http://schemas.microsoft.com/office/drawing/2014/main" id="{880FC0B9-CAB8-7420-446B-309C9B5FBF97}"/>
+          <p:cNvPr id="13" name="Rectangle 12">
+            <a:extLst>
+              <a:ext uri="{FF2B5EF4-FFF2-40B4-BE49-F238E27FC236}">
+                <a16:creationId xmlns:a16="http://schemas.microsoft.com/office/drawing/2014/main" id="{8D4E91D4-FF95-6CC6-082E-5A2C76CF268F}"/>
+              </a:ext>
+            </a:extLst>
+          </p:cNvPr>
+          <p:cNvSpPr/>
+          <p:nvPr/>
+        </p:nvSpPr>
+        <p:spPr>
+          <a:xfrm>
+            <a:off x="1016355" y="961291"/>
+            <a:ext cx="2052320" cy="335280"/>
+          </a:xfrm>
+          <a:prstGeom prst="rect">
+            <a:avLst/>
+          </a:prstGeom>
+          <a:solidFill>
+            <a:schemeClr val="bg2">
+              <a:lumMod val="90000"/>
+            </a:schemeClr>
+          </a:solidFill>
+          <a:ln>
+            <a:solidFill>
+              <a:schemeClr val="tx1"/>
+            </a:solidFill>
+          </a:ln>
+        </p:spPr>
+        <p:style>
+          <a:lnRef idx="2">
+            <a:schemeClr val="accent1">
+              <a:shade val="50000"/>
+            </a:schemeClr>
+          </a:lnRef>
+          <a:fillRef idx="1">
+            <a:schemeClr val="accent1"/>
+          </a:fillRef>
+          <a:effectRef idx="0">
+            <a:schemeClr val="accent1"/>
+          </a:effectRef>
+          <a:fontRef idx="minor">
+            <a:schemeClr val="lt1"/>
+          </a:fontRef>
+        </p:style>
+        <p:txBody>
+          <a:bodyPr rtlCol="0" anchor="ctr"/>
+          <a:lstStyle/>
+          <a:p>
+            <a:pPr algn="ctr"/>
+            <a:r>
+              <a:rPr lang="en-US" dirty="0">
+                <a:solidFill>
+                  <a:schemeClr val="tx1">
+                    <a:lumMod val="85000"/>
+                    <a:lumOff val="15000"/>
+                  </a:schemeClr>
+                </a:solidFill>
+              </a:rPr>
+              <a:t>Whisking cycle</a:t>
+            </a:r>
+          </a:p>
+        </p:txBody>
+      </p:sp>
+      <p:sp>
+        <p:nvSpPr>
+          <p:cNvPr id="14" name="Rectangle 13">
+            <a:extLst>
+              <a:ext uri="{FF2B5EF4-FFF2-40B4-BE49-F238E27FC236}">
+                <a16:creationId xmlns:a16="http://schemas.microsoft.com/office/drawing/2014/main" id="{2F4C1398-E430-F64E-ED9E-4B86488887B8}"/>
+              </a:ext>
+            </a:extLst>
+          </p:cNvPr>
+          <p:cNvSpPr/>
+          <p:nvPr/>
+        </p:nvSpPr>
+        <p:spPr>
+          <a:xfrm>
+            <a:off x="3087725" y="961291"/>
+            <a:ext cx="2052320" cy="335280"/>
+          </a:xfrm>
+          <a:prstGeom prst="rect">
+            <a:avLst/>
+          </a:prstGeom>
+          <a:solidFill>
+            <a:schemeClr val="bg2">
+              <a:lumMod val="90000"/>
+            </a:schemeClr>
+          </a:solidFill>
+          <a:ln>
+            <a:solidFill>
+              <a:schemeClr val="tx1"/>
+            </a:solidFill>
+          </a:ln>
+        </p:spPr>
+        <p:style>
+          <a:lnRef idx="2">
+            <a:schemeClr val="accent1">
+              <a:shade val="50000"/>
+            </a:schemeClr>
+          </a:lnRef>
+          <a:fillRef idx="1">
+            <a:schemeClr val="accent1"/>
+          </a:fillRef>
+          <a:effectRef idx="0">
+            <a:schemeClr val="accent1"/>
+          </a:effectRef>
+          <a:fontRef idx="minor">
+            <a:schemeClr val="lt1"/>
+          </a:fontRef>
+        </p:style>
+        <p:txBody>
+          <a:bodyPr rtlCol="0" anchor="ctr"/>
+          <a:lstStyle/>
+          <a:p>
+            <a:pPr algn="ctr"/>
+            <a:r>
+              <a:rPr lang="en-US" dirty="0">
+                <a:solidFill>
+                  <a:schemeClr val="tx1">
+                    <a:lumMod val="85000"/>
+                    <a:lumOff val="15000"/>
+                  </a:schemeClr>
+                </a:solidFill>
+              </a:rPr>
+              <a:t>Whisking cycle</a:t>
+            </a:r>
+          </a:p>
+        </p:txBody>
+      </p:sp>
+      <p:sp>
+        <p:nvSpPr>
+          <p:cNvPr id="15" name="Rectangle 14">
+            <a:extLst>
+              <a:ext uri="{FF2B5EF4-FFF2-40B4-BE49-F238E27FC236}">
+                <a16:creationId xmlns:a16="http://schemas.microsoft.com/office/drawing/2014/main" id="{6A0B6138-BA6C-30FC-7203-FA2E85552491}"/>
+              </a:ext>
+            </a:extLst>
+          </p:cNvPr>
+          <p:cNvSpPr/>
+          <p:nvPr/>
+        </p:nvSpPr>
+        <p:spPr>
+          <a:xfrm>
+            <a:off x="5159095" y="961291"/>
+            <a:ext cx="2052320" cy="335280"/>
+          </a:xfrm>
+          <a:prstGeom prst="rect">
+            <a:avLst/>
+          </a:prstGeom>
+          <a:solidFill>
+            <a:schemeClr val="bg2">
+              <a:lumMod val="90000"/>
+            </a:schemeClr>
+          </a:solidFill>
+          <a:ln>
+            <a:solidFill>
+              <a:schemeClr val="tx1"/>
+            </a:solidFill>
+          </a:ln>
+        </p:spPr>
+        <p:style>
+          <a:lnRef idx="2">
+            <a:schemeClr val="accent1">
+              <a:shade val="50000"/>
+            </a:schemeClr>
+          </a:lnRef>
+          <a:fillRef idx="1">
+            <a:schemeClr val="accent1"/>
+          </a:fillRef>
+          <a:effectRef idx="0">
+            <a:schemeClr val="accent1"/>
+          </a:effectRef>
+          <a:fontRef idx="minor">
+            <a:schemeClr val="lt1"/>
+          </a:fontRef>
+        </p:style>
+        <p:txBody>
+          <a:bodyPr rtlCol="0" anchor="ctr"/>
+          <a:lstStyle/>
+          <a:p>
+            <a:pPr algn="ctr"/>
+            <a:r>
+              <a:rPr lang="en-US" dirty="0">
+                <a:solidFill>
+                  <a:schemeClr val="tx1">
+                    <a:lumMod val="85000"/>
+                    <a:lumOff val="15000"/>
+                  </a:schemeClr>
+                </a:solidFill>
+              </a:rPr>
+              <a:t>Whisking cycle</a:t>
+            </a:r>
+          </a:p>
+        </p:txBody>
+      </p:sp>
+      <p:cxnSp>
+        <p:nvCxnSpPr>
+          <p:cNvPr id="16" name="Straight Arrow Connector 15">
+            <a:extLst>
+              <a:ext uri="{FF2B5EF4-FFF2-40B4-BE49-F238E27FC236}">
+                <a16:creationId xmlns:a16="http://schemas.microsoft.com/office/drawing/2014/main" id="{BDC0EA1D-C1A2-9659-9157-2338BAD67053}"/>
+              </a:ext>
+            </a:extLst>
+          </p:cNvPr>
+          <p:cNvCxnSpPr>
+            <a:cxnSpLocks/>
+          </p:cNvCxnSpPr>
+          <p:nvPr/>
+        </p:nvCxnSpPr>
+        <p:spPr>
+          <a:xfrm>
+            <a:off x="1026515" y="791587"/>
+            <a:ext cx="0" cy="172720"/>
+          </a:xfrm>
+          <a:prstGeom prst="straightConnector1">
+            <a:avLst/>
+          </a:prstGeom>
+          <a:ln>
+            <a:solidFill>
+              <a:schemeClr val="tx1"/>
+            </a:solidFill>
+            <a:tailEnd type="triangle"/>
+          </a:ln>
+        </p:spPr>
+        <p:style>
+          <a:lnRef idx="1">
+            <a:schemeClr val="accent1"/>
+          </a:lnRef>
+          <a:fillRef idx="0">
+            <a:schemeClr val="accent1"/>
+          </a:fillRef>
+          <a:effectRef idx="0">
+            <a:schemeClr val="accent1"/>
+          </a:effectRef>
+          <a:fontRef idx="minor">
+            <a:schemeClr val="tx1"/>
+          </a:fontRef>
+        </p:style>
+      </p:cxnSp>
+      <p:sp>
+        <p:nvSpPr>
+          <p:cNvPr id="17" name="TextBox 16">
+            <a:extLst>
+              <a:ext uri="{FF2B5EF4-FFF2-40B4-BE49-F238E27FC236}">
+                <a16:creationId xmlns:a16="http://schemas.microsoft.com/office/drawing/2014/main" id="{22162FE3-0297-E4F7-CA9A-67A13D3F0639}"/>
               </a:ext>
             </a:extLst>
           </p:cNvPr>
@@ -5913,8 +5643,8 @@
         </p:nvSpPr>
         <p:spPr>
           <a:xfrm>
-            <a:off x="317032" y="350263"/>
-            <a:ext cx="433132" cy="584775"/>
+            <a:off x="533400" y="422255"/>
+            <a:ext cx="1099404" cy="369332"/>
           </a:xfrm>
           <a:prstGeom prst="rect">
             <a:avLst/>
@@ -5928,6 +5658,701 @@
           <a:lstStyle/>
           <a:p>
             <a:r>
+              <a:rPr lang="en-US" dirty="0"/>
+              <a:t>Sim starts</a:t>
+            </a:r>
+          </a:p>
+        </p:txBody>
+      </p:sp>
+      <p:sp>
+        <p:nvSpPr>
+          <p:cNvPr id="18" name="Rectangle 17">
+            <a:extLst>
+              <a:ext uri="{FF2B5EF4-FFF2-40B4-BE49-F238E27FC236}">
+                <a16:creationId xmlns:a16="http://schemas.microsoft.com/office/drawing/2014/main" id="{D4287601-DA86-CE59-A3DC-5194AD90B0F5}"/>
+              </a:ext>
+            </a:extLst>
+          </p:cNvPr>
+          <p:cNvSpPr/>
+          <p:nvPr/>
+        </p:nvSpPr>
+        <p:spPr>
+          <a:xfrm>
+            <a:off x="1016001" y="1577408"/>
+            <a:ext cx="1262883" cy="335280"/>
+          </a:xfrm>
+          <a:prstGeom prst="rect">
+            <a:avLst/>
+          </a:prstGeom>
+          <a:solidFill>
+            <a:schemeClr val="accent6">
+              <a:lumMod val="40000"/>
+              <a:lumOff val="60000"/>
+            </a:schemeClr>
+          </a:solidFill>
+          <a:ln>
+            <a:solidFill>
+              <a:schemeClr val="tx1"/>
+            </a:solidFill>
+          </a:ln>
+        </p:spPr>
+        <p:style>
+          <a:lnRef idx="2">
+            <a:schemeClr val="accent1">
+              <a:shade val="50000"/>
+            </a:schemeClr>
+          </a:lnRef>
+          <a:fillRef idx="1">
+            <a:schemeClr val="accent1"/>
+          </a:fillRef>
+          <a:effectRef idx="0">
+            <a:schemeClr val="accent1"/>
+          </a:effectRef>
+          <a:fontRef idx="minor">
+            <a:schemeClr val="lt1"/>
+          </a:fontRef>
+        </p:style>
+        <p:txBody>
+          <a:bodyPr rtlCol="0" anchor="ctr"/>
+          <a:lstStyle/>
+          <a:p>
+            <a:pPr algn="ctr"/>
+            <a:r>
+              <a:rPr lang="en-US" b="1" dirty="0">
+                <a:solidFill>
+                  <a:schemeClr val="accent6">
+                    <a:lumMod val="50000"/>
+                  </a:schemeClr>
+                </a:solidFill>
+              </a:rPr>
+              <a:t>contract</a:t>
+            </a:r>
+          </a:p>
+        </p:txBody>
+      </p:sp>
+      <p:sp>
+        <p:nvSpPr>
+          <p:cNvPr id="19" name="Rectangle 18">
+            <a:extLst>
+              <a:ext uri="{FF2B5EF4-FFF2-40B4-BE49-F238E27FC236}">
+                <a16:creationId xmlns:a16="http://schemas.microsoft.com/office/drawing/2014/main" id="{EB18F2E1-1E49-AA7C-91DE-3AF6E50EC95A}"/>
+              </a:ext>
+            </a:extLst>
+          </p:cNvPr>
+          <p:cNvSpPr/>
+          <p:nvPr/>
+        </p:nvSpPr>
+        <p:spPr>
+          <a:xfrm>
+            <a:off x="2278884" y="1577408"/>
+            <a:ext cx="789437" cy="335280"/>
+          </a:xfrm>
+          <a:prstGeom prst="rect">
+            <a:avLst/>
+          </a:prstGeom>
+          <a:solidFill>
+            <a:schemeClr val="accent6">
+              <a:lumMod val="40000"/>
+              <a:lumOff val="60000"/>
+            </a:schemeClr>
+          </a:solidFill>
+          <a:ln>
+            <a:solidFill>
+              <a:schemeClr val="tx1"/>
+            </a:solidFill>
+          </a:ln>
+        </p:spPr>
+        <p:style>
+          <a:lnRef idx="2">
+            <a:schemeClr val="accent1">
+              <a:shade val="50000"/>
+            </a:schemeClr>
+          </a:lnRef>
+          <a:fillRef idx="1">
+            <a:schemeClr val="accent1"/>
+          </a:fillRef>
+          <a:effectRef idx="0">
+            <a:schemeClr val="accent1"/>
+          </a:effectRef>
+          <a:fontRef idx="minor">
+            <a:schemeClr val="lt1"/>
+          </a:fontRef>
+        </p:style>
+        <p:txBody>
+          <a:bodyPr rtlCol="0" anchor="ctr"/>
+          <a:lstStyle/>
+          <a:p>
+            <a:pPr algn="ctr"/>
+            <a:r>
+              <a:rPr lang="en-US" dirty="0">
+                <a:solidFill>
+                  <a:schemeClr val="accent6">
+                    <a:lumMod val="50000"/>
+                  </a:schemeClr>
+                </a:solidFill>
+              </a:rPr>
+              <a:t>relax</a:t>
+            </a:r>
+          </a:p>
+        </p:txBody>
+      </p:sp>
+      <p:sp>
+        <p:nvSpPr>
+          <p:cNvPr id="20" name="Rectangle 19">
+            <a:extLst>
+              <a:ext uri="{FF2B5EF4-FFF2-40B4-BE49-F238E27FC236}">
+                <a16:creationId xmlns:a16="http://schemas.microsoft.com/office/drawing/2014/main" id="{EECCBF29-F446-F31E-B324-7896B9F818EB}"/>
+              </a:ext>
+            </a:extLst>
+          </p:cNvPr>
+          <p:cNvSpPr/>
+          <p:nvPr/>
+        </p:nvSpPr>
+        <p:spPr>
+          <a:xfrm>
+            <a:off x="2055954" y="2198865"/>
+            <a:ext cx="1026160" cy="335280"/>
+          </a:xfrm>
+          <a:prstGeom prst="rect">
+            <a:avLst/>
+          </a:prstGeom>
+          <a:solidFill>
+            <a:schemeClr val="accent1">
+              <a:lumMod val="20000"/>
+              <a:lumOff val="80000"/>
+            </a:schemeClr>
+          </a:solidFill>
+          <a:ln>
+            <a:solidFill>
+              <a:schemeClr val="tx1"/>
+            </a:solidFill>
+          </a:ln>
+        </p:spPr>
+        <p:style>
+          <a:lnRef idx="2">
+            <a:schemeClr val="accent1">
+              <a:shade val="50000"/>
+            </a:schemeClr>
+          </a:lnRef>
+          <a:fillRef idx="1">
+            <a:schemeClr val="accent1"/>
+          </a:fillRef>
+          <a:effectRef idx="0">
+            <a:schemeClr val="accent1"/>
+          </a:effectRef>
+          <a:fontRef idx="minor">
+            <a:schemeClr val="lt1"/>
+          </a:fontRef>
+        </p:style>
+        <p:txBody>
+          <a:bodyPr rtlCol="0" anchor="ctr"/>
+          <a:lstStyle/>
+          <a:p>
+            <a:pPr algn="ctr"/>
+            <a:r>
+              <a:rPr lang="en-US" b="1" dirty="0">
+                <a:solidFill>
+                  <a:schemeClr val="accent1">
+                    <a:lumMod val="75000"/>
+                  </a:schemeClr>
+                </a:solidFill>
+              </a:rPr>
+              <a:t>contract</a:t>
+            </a:r>
+          </a:p>
+        </p:txBody>
+      </p:sp>
+      <p:sp>
+        <p:nvSpPr>
+          <p:cNvPr id="21" name="Rectangle 20">
+            <a:extLst>
+              <a:ext uri="{FF2B5EF4-FFF2-40B4-BE49-F238E27FC236}">
+                <a16:creationId xmlns:a16="http://schemas.microsoft.com/office/drawing/2014/main" id="{A0BD5C95-18A2-BADF-B64A-6902E94A416C}"/>
+              </a:ext>
+            </a:extLst>
+          </p:cNvPr>
+          <p:cNvSpPr/>
+          <p:nvPr/>
+        </p:nvSpPr>
+        <p:spPr>
+          <a:xfrm>
+            <a:off x="3082114" y="2198865"/>
+            <a:ext cx="1026160" cy="335280"/>
+          </a:xfrm>
+          <a:prstGeom prst="rect">
+            <a:avLst/>
+          </a:prstGeom>
+          <a:solidFill>
+            <a:schemeClr val="accent1">
+              <a:lumMod val="20000"/>
+              <a:lumOff val="80000"/>
+            </a:schemeClr>
+          </a:solidFill>
+          <a:ln>
+            <a:solidFill>
+              <a:schemeClr val="tx1"/>
+            </a:solidFill>
+          </a:ln>
+        </p:spPr>
+        <p:style>
+          <a:lnRef idx="2">
+            <a:schemeClr val="accent1">
+              <a:shade val="50000"/>
+            </a:schemeClr>
+          </a:lnRef>
+          <a:fillRef idx="1">
+            <a:schemeClr val="accent1"/>
+          </a:fillRef>
+          <a:effectRef idx="0">
+            <a:schemeClr val="accent1"/>
+          </a:effectRef>
+          <a:fontRef idx="minor">
+            <a:schemeClr val="lt1"/>
+          </a:fontRef>
+        </p:style>
+        <p:txBody>
+          <a:bodyPr rtlCol="0" anchor="ctr"/>
+          <a:lstStyle/>
+          <a:p>
+            <a:pPr algn="ctr"/>
+            <a:r>
+              <a:rPr lang="en-US" dirty="0">
+                <a:solidFill>
+                  <a:schemeClr val="accent1">
+                    <a:lumMod val="75000"/>
+                  </a:schemeClr>
+                </a:solidFill>
+              </a:rPr>
+              <a:t>relax</a:t>
+            </a:r>
+          </a:p>
+        </p:txBody>
+      </p:sp>
+      <p:sp>
+        <p:nvSpPr>
+          <p:cNvPr id="22" name="Rectangle 21">
+            <a:extLst>
+              <a:ext uri="{FF2B5EF4-FFF2-40B4-BE49-F238E27FC236}">
+                <a16:creationId xmlns:a16="http://schemas.microsoft.com/office/drawing/2014/main" id="{C5ED5220-C700-BE91-87D4-19CBF0941063}"/>
+              </a:ext>
+            </a:extLst>
+          </p:cNvPr>
+          <p:cNvSpPr/>
+          <p:nvPr/>
+        </p:nvSpPr>
+        <p:spPr>
+          <a:xfrm>
+            <a:off x="6201234" y="2198865"/>
+            <a:ext cx="2052320" cy="335280"/>
+          </a:xfrm>
+          <a:prstGeom prst="rect">
+            <a:avLst/>
+          </a:prstGeom>
+          <a:solidFill>
+            <a:schemeClr val="accent1">
+              <a:lumMod val="20000"/>
+              <a:lumOff val="80000"/>
+            </a:schemeClr>
+          </a:solidFill>
+          <a:ln>
+            <a:solidFill>
+              <a:schemeClr val="tx1"/>
+            </a:solidFill>
+          </a:ln>
+        </p:spPr>
+        <p:style>
+          <a:lnRef idx="2">
+            <a:schemeClr val="accent1">
+              <a:shade val="50000"/>
+            </a:schemeClr>
+          </a:lnRef>
+          <a:fillRef idx="1">
+            <a:schemeClr val="accent1"/>
+          </a:fillRef>
+          <a:effectRef idx="0">
+            <a:schemeClr val="accent1"/>
+          </a:effectRef>
+          <a:fontRef idx="minor">
+            <a:schemeClr val="lt1"/>
+          </a:fontRef>
+        </p:style>
+        <p:txBody>
+          <a:bodyPr rtlCol="0" anchor="ctr"/>
+          <a:lstStyle/>
+          <a:p>
+            <a:pPr algn="ctr"/>
+            <a:r>
+              <a:rPr lang="en-US" dirty="0">
+                <a:solidFill>
+                  <a:schemeClr val="accent1">
+                    <a:lumMod val="75000"/>
+                  </a:schemeClr>
+                </a:solidFill>
+              </a:rPr>
+              <a:t>Phase 2</a:t>
+            </a:r>
+          </a:p>
+        </p:txBody>
+      </p:sp>
+      <p:sp>
+        <p:nvSpPr>
+          <p:cNvPr id="23" name="Rectangle 22">
+            <a:extLst>
+              <a:ext uri="{FF2B5EF4-FFF2-40B4-BE49-F238E27FC236}">
+                <a16:creationId xmlns:a16="http://schemas.microsoft.com/office/drawing/2014/main" id="{B813F8B5-3192-75D8-B0AA-DF53DBBD8A56}"/>
+              </a:ext>
+            </a:extLst>
+          </p:cNvPr>
+          <p:cNvSpPr/>
+          <p:nvPr/>
+        </p:nvSpPr>
+        <p:spPr>
+          <a:xfrm>
+            <a:off x="5158741" y="1573062"/>
+            <a:ext cx="2052320" cy="335280"/>
+          </a:xfrm>
+          <a:prstGeom prst="rect">
+            <a:avLst/>
+          </a:prstGeom>
+          <a:solidFill>
+            <a:schemeClr val="accent6">
+              <a:lumMod val="40000"/>
+              <a:lumOff val="60000"/>
+            </a:schemeClr>
+          </a:solidFill>
+          <a:ln>
+            <a:solidFill>
+              <a:schemeClr val="tx1"/>
+            </a:solidFill>
+          </a:ln>
+        </p:spPr>
+        <p:style>
+          <a:lnRef idx="2">
+            <a:schemeClr val="accent1">
+              <a:shade val="50000"/>
+            </a:schemeClr>
+          </a:lnRef>
+          <a:fillRef idx="1">
+            <a:schemeClr val="accent1"/>
+          </a:fillRef>
+          <a:effectRef idx="0">
+            <a:schemeClr val="accent1"/>
+          </a:effectRef>
+          <a:fontRef idx="minor">
+            <a:schemeClr val="lt1"/>
+          </a:fontRef>
+        </p:style>
+        <p:txBody>
+          <a:bodyPr rtlCol="0" anchor="ctr"/>
+          <a:lstStyle/>
+          <a:p>
+            <a:pPr algn="ctr"/>
+            <a:r>
+              <a:rPr lang="en-US" dirty="0">
+                <a:solidFill>
+                  <a:schemeClr val="accent6">
+                    <a:lumMod val="50000"/>
+                  </a:schemeClr>
+                </a:solidFill>
+              </a:rPr>
+              <a:t>Phase 1</a:t>
+            </a:r>
+          </a:p>
+        </p:txBody>
+      </p:sp>
+      <p:sp>
+        <p:nvSpPr>
+          <p:cNvPr id="24" name="Rectangle 23">
+            <a:extLst>
+              <a:ext uri="{FF2B5EF4-FFF2-40B4-BE49-F238E27FC236}">
+                <a16:creationId xmlns:a16="http://schemas.microsoft.com/office/drawing/2014/main" id="{168A9A89-A115-649A-8FC3-9597E4CDB4A6}"/>
+              </a:ext>
+            </a:extLst>
+          </p:cNvPr>
+          <p:cNvSpPr/>
+          <p:nvPr/>
+        </p:nvSpPr>
+        <p:spPr>
+          <a:xfrm>
+            <a:off x="4129864" y="2198368"/>
+            <a:ext cx="1026160" cy="335280"/>
+          </a:xfrm>
+          <a:prstGeom prst="rect">
+            <a:avLst/>
+          </a:prstGeom>
+          <a:solidFill>
+            <a:schemeClr val="accent1">
+              <a:lumMod val="20000"/>
+              <a:lumOff val="80000"/>
+            </a:schemeClr>
+          </a:solidFill>
+          <a:ln>
+            <a:solidFill>
+              <a:schemeClr val="tx1"/>
+            </a:solidFill>
+          </a:ln>
+        </p:spPr>
+        <p:style>
+          <a:lnRef idx="2">
+            <a:schemeClr val="accent1">
+              <a:shade val="50000"/>
+            </a:schemeClr>
+          </a:lnRef>
+          <a:fillRef idx="1">
+            <a:schemeClr val="accent1"/>
+          </a:fillRef>
+          <a:effectRef idx="0">
+            <a:schemeClr val="accent1"/>
+          </a:effectRef>
+          <a:fontRef idx="minor">
+            <a:schemeClr val="lt1"/>
+          </a:fontRef>
+        </p:style>
+        <p:txBody>
+          <a:bodyPr rtlCol="0" anchor="ctr"/>
+          <a:lstStyle/>
+          <a:p>
+            <a:pPr algn="ctr"/>
+            <a:r>
+              <a:rPr lang="en-US" b="1" dirty="0">
+                <a:solidFill>
+                  <a:schemeClr val="accent1">
+                    <a:lumMod val="75000"/>
+                  </a:schemeClr>
+                </a:solidFill>
+              </a:rPr>
+              <a:t>contract</a:t>
+            </a:r>
+          </a:p>
+        </p:txBody>
+      </p:sp>
+      <p:sp>
+        <p:nvSpPr>
+          <p:cNvPr id="25" name="Rectangle 24">
+            <a:extLst>
+              <a:ext uri="{FF2B5EF4-FFF2-40B4-BE49-F238E27FC236}">
+                <a16:creationId xmlns:a16="http://schemas.microsoft.com/office/drawing/2014/main" id="{0F2972BE-1363-87E4-A9A0-66C59C879CCA}"/>
+              </a:ext>
+            </a:extLst>
+          </p:cNvPr>
+          <p:cNvSpPr/>
+          <p:nvPr/>
+        </p:nvSpPr>
+        <p:spPr>
+          <a:xfrm>
+            <a:off x="5156024" y="2198368"/>
+            <a:ext cx="1026160" cy="335280"/>
+          </a:xfrm>
+          <a:prstGeom prst="rect">
+            <a:avLst/>
+          </a:prstGeom>
+          <a:solidFill>
+            <a:schemeClr val="accent1">
+              <a:lumMod val="20000"/>
+              <a:lumOff val="80000"/>
+            </a:schemeClr>
+          </a:solidFill>
+          <a:ln>
+            <a:solidFill>
+              <a:schemeClr val="tx1"/>
+            </a:solidFill>
+          </a:ln>
+        </p:spPr>
+        <p:style>
+          <a:lnRef idx="2">
+            <a:schemeClr val="accent1">
+              <a:shade val="50000"/>
+            </a:schemeClr>
+          </a:lnRef>
+          <a:fillRef idx="1">
+            <a:schemeClr val="accent1"/>
+          </a:fillRef>
+          <a:effectRef idx="0">
+            <a:schemeClr val="accent1"/>
+          </a:effectRef>
+          <a:fontRef idx="minor">
+            <a:schemeClr val="lt1"/>
+          </a:fontRef>
+        </p:style>
+        <p:txBody>
+          <a:bodyPr rtlCol="0" anchor="ctr"/>
+          <a:lstStyle/>
+          <a:p>
+            <a:pPr algn="ctr"/>
+            <a:r>
+              <a:rPr lang="en-US" dirty="0">
+                <a:solidFill>
+                  <a:schemeClr val="accent1">
+                    <a:lumMod val="75000"/>
+                  </a:schemeClr>
+                </a:solidFill>
+              </a:rPr>
+              <a:t>relax</a:t>
+            </a:r>
+          </a:p>
+        </p:txBody>
+      </p:sp>
+      <p:sp>
+        <p:nvSpPr>
+          <p:cNvPr id="26" name="Rectangle 25">
+            <a:extLst>
+              <a:ext uri="{FF2B5EF4-FFF2-40B4-BE49-F238E27FC236}">
+                <a16:creationId xmlns:a16="http://schemas.microsoft.com/office/drawing/2014/main" id="{CB1A4B94-687D-6CA3-F14D-F51C63DBECED}"/>
+              </a:ext>
+            </a:extLst>
+          </p:cNvPr>
+          <p:cNvSpPr/>
+          <p:nvPr/>
+        </p:nvSpPr>
+        <p:spPr>
+          <a:xfrm>
+            <a:off x="3087371" y="1573311"/>
+            <a:ext cx="1281933" cy="335280"/>
+          </a:xfrm>
+          <a:prstGeom prst="rect">
+            <a:avLst/>
+          </a:prstGeom>
+          <a:solidFill>
+            <a:schemeClr val="accent6">
+              <a:lumMod val="40000"/>
+              <a:lumOff val="60000"/>
+            </a:schemeClr>
+          </a:solidFill>
+          <a:ln>
+            <a:solidFill>
+              <a:schemeClr val="tx1"/>
+            </a:solidFill>
+          </a:ln>
+        </p:spPr>
+        <p:style>
+          <a:lnRef idx="2">
+            <a:schemeClr val="accent1">
+              <a:shade val="50000"/>
+            </a:schemeClr>
+          </a:lnRef>
+          <a:fillRef idx="1">
+            <a:schemeClr val="accent1"/>
+          </a:fillRef>
+          <a:effectRef idx="0">
+            <a:schemeClr val="accent1"/>
+          </a:effectRef>
+          <a:fontRef idx="minor">
+            <a:schemeClr val="lt1"/>
+          </a:fontRef>
+        </p:style>
+        <p:txBody>
+          <a:bodyPr rtlCol="0" anchor="ctr"/>
+          <a:lstStyle/>
+          <a:p>
+            <a:pPr algn="ctr"/>
+            <a:r>
+              <a:rPr lang="en-US" b="1" dirty="0">
+                <a:solidFill>
+                  <a:schemeClr val="accent6">
+                    <a:lumMod val="50000"/>
+                  </a:schemeClr>
+                </a:solidFill>
+              </a:rPr>
+              <a:t>contract</a:t>
+            </a:r>
+          </a:p>
+        </p:txBody>
+      </p:sp>
+      <p:sp>
+        <p:nvSpPr>
+          <p:cNvPr id="27" name="Rectangle 26">
+            <a:extLst>
+              <a:ext uri="{FF2B5EF4-FFF2-40B4-BE49-F238E27FC236}">
+                <a16:creationId xmlns:a16="http://schemas.microsoft.com/office/drawing/2014/main" id="{901709EA-3B88-CC21-3FB4-3103F8769DC9}"/>
+              </a:ext>
+            </a:extLst>
+          </p:cNvPr>
+          <p:cNvSpPr/>
+          <p:nvPr/>
+        </p:nvSpPr>
+        <p:spPr>
+          <a:xfrm>
+            <a:off x="4369304" y="1573311"/>
+            <a:ext cx="770387" cy="335280"/>
+          </a:xfrm>
+          <a:prstGeom prst="rect">
+            <a:avLst/>
+          </a:prstGeom>
+          <a:solidFill>
+            <a:schemeClr val="accent6">
+              <a:lumMod val="40000"/>
+              <a:lumOff val="60000"/>
+            </a:schemeClr>
+          </a:solidFill>
+          <a:ln>
+            <a:solidFill>
+              <a:schemeClr val="tx1"/>
+            </a:solidFill>
+          </a:ln>
+        </p:spPr>
+        <p:style>
+          <a:lnRef idx="2">
+            <a:schemeClr val="accent1">
+              <a:shade val="50000"/>
+            </a:schemeClr>
+          </a:lnRef>
+          <a:fillRef idx="1">
+            <a:schemeClr val="accent1"/>
+          </a:fillRef>
+          <a:effectRef idx="0">
+            <a:schemeClr val="accent1"/>
+          </a:effectRef>
+          <a:fontRef idx="minor">
+            <a:schemeClr val="lt1"/>
+          </a:fontRef>
+        </p:style>
+        <p:txBody>
+          <a:bodyPr rtlCol="0" anchor="ctr"/>
+          <a:lstStyle/>
+          <a:p>
+            <a:pPr algn="ctr"/>
+            <a:r>
+              <a:rPr lang="en-US" dirty="0">
+                <a:solidFill>
+                  <a:schemeClr val="accent6">
+                    <a:lumMod val="50000"/>
+                  </a:schemeClr>
+                </a:solidFill>
+              </a:rPr>
+              <a:t>relax</a:t>
+            </a:r>
+          </a:p>
+        </p:txBody>
+      </p:sp>
+      <p:sp>
+        <p:nvSpPr>
+          <p:cNvPr id="30" name="TextBox 29">
+            <a:extLst>
+              <a:ext uri="{FF2B5EF4-FFF2-40B4-BE49-F238E27FC236}">
+                <a16:creationId xmlns:a16="http://schemas.microsoft.com/office/drawing/2014/main" id="{1A002333-5E54-C0EE-5A83-E35E97393AE1}"/>
+              </a:ext>
+            </a:extLst>
+          </p:cNvPr>
+          <p:cNvSpPr txBox="1"/>
+          <p:nvPr/>
+        </p:nvSpPr>
+        <p:spPr>
+          <a:xfrm>
+            <a:off x="103079" y="-18796"/>
+            <a:ext cx="367527" cy="584775"/>
+          </a:xfrm>
+          <a:prstGeom prst="rect">
+            <a:avLst/>
+          </a:prstGeom>
+          <a:noFill/>
+        </p:spPr>
+        <p:txBody>
+          <a:bodyPr wrap="square" rtlCol="0">
+            <a:spAutoFit/>
+          </a:bodyPr>
+          <a:lstStyle/>
+          <a:p>
+            <a:r>
               <a:rPr lang="en-US" sz="3200" b="1" dirty="0"/>
               <a:t>A</a:t>
             </a:r>
@@ -5936,10 +6361,10 @@
       </p:sp>
       <p:sp>
         <p:nvSpPr>
-          <p:cNvPr id="5" name="TextBox 4">
-            <a:extLst>
-              <a:ext uri="{FF2B5EF4-FFF2-40B4-BE49-F238E27FC236}">
-                <a16:creationId xmlns:a16="http://schemas.microsoft.com/office/drawing/2014/main" id="{48097C14-66F8-8714-E1D8-0C715615A003}"/>
+          <p:cNvPr id="31" name="TextBox 30">
+            <a:extLst>
+              <a:ext uri="{FF2B5EF4-FFF2-40B4-BE49-F238E27FC236}">
+                <a16:creationId xmlns:a16="http://schemas.microsoft.com/office/drawing/2014/main" id="{05F8CEFC-DD2E-96BE-DEDB-4A4418C52E33}"/>
               </a:ext>
             </a:extLst>
           </p:cNvPr>
@@ -5948,8 +6373,8 @@
         </p:nvSpPr>
         <p:spPr>
           <a:xfrm>
-            <a:off x="2717200" y="350263"/>
-            <a:ext cx="402674" cy="584775"/>
+            <a:off x="103079" y="2887158"/>
+            <a:ext cx="352564" cy="584775"/>
           </a:xfrm>
           <a:prstGeom prst="rect">
             <a:avLst/>
@@ -5957,24 +6382,24 @@
           <a:noFill/>
         </p:spPr>
         <p:txBody>
-          <a:bodyPr wrap="none" rtlCol="0">
+          <a:bodyPr wrap="square" rtlCol="0">
             <a:spAutoFit/>
           </a:bodyPr>
           <a:lstStyle/>
           <a:p>
             <a:r>
               <a:rPr lang="en-US" sz="3200" b="1" dirty="0"/>
-              <a:t>C</a:t>
-            </a:r>
-          </a:p>
-        </p:txBody>
-      </p:sp>
-      <p:sp>
-        <p:nvSpPr>
-          <p:cNvPr id="6" name="TextBox 5">
-            <a:extLst>
-              <a:ext uri="{FF2B5EF4-FFF2-40B4-BE49-F238E27FC236}">
-                <a16:creationId xmlns:a16="http://schemas.microsoft.com/office/drawing/2014/main" id="{FA54CA34-3B61-A872-899B-B449E7FCF8C9}"/>
+              <a:t>B</a:t>
+            </a:r>
+          </a:p>
+        </p:txBody>
+      </p:sp>
+      <p:sp>
+        <p:nvSpPr>
+          <p:cNvPr id="32" name="TextBox 31">
+            <a:extLst>
+              <a:ext uri="{FF2B5EF4-FFF2-40B4-BE49-F238E27FC236}">
+                <a16:creationId xmlns:a16="http://schemas.microsoft.com/office/drawing/2014/main" id="{5ABD5460-079E-2310-D158-E88843EEE5A8}"/>
               </a:ext>
             </a:extLst>
           </p:cNvPr>
@@ -5983,8 +6408,8 @@
         </p:nvSpPr>
         <p:spPr>
           <a:xfrm>
-            <a:off x="6145583" y="279403"/>
-            <a:ext cx="442750" cy="584775"/>
+            <a:off x="1120165" y="11676927"/>
+            <a:ext cx="7227039" cy="923330"/>
           </a:xfrm>
           <a:prstGeom prst="rect">
             <a:avLst/>
@@ -5992,18 +6417,72 @@
           <a:noFill/>
         </p:spPr>
         <p:txBody>
-          <a:bodyPr wrap="none" rtlCol="0">
+          <a:bodyPr wrap="square" rtlCol="0">
             <a:spAutoFit/>
           </a:bodyPr>
           <a:lstStyle/>
           <a:p>
             <a:r>
-              <a:rPr lang="en-US" sz="3200" b="1" dirty="0"/>
-              <a:t>D</a:t>
-            </a:r>
-          </a:p>
-        </p:txBody>
-      </p:sp>
+              <a:rPr lang="en-US" dirty="0"/>
+              <a:t>Highlight: </a:t>
+            </a:r>
+          </a:p>
+          <a:p>
+            <a:pPr marL="342900" indent="-342900">
+              <a:buAutoNum type="arabicParenBoth"/>
+            </a:pPr>
+            <a:r>
+              <a:rPr lang="en-US" dirty="0"/>
+              <a:t>Compare to kinematic profile (slow raping up and fast retraction)</a:t>
+            </a:r>
+          </a:p>
+          <a:p>
+            <a:pPr marL="342900" indent="-342900">
+              <a:buAutoNum type="arabicParenBoth"/>
+            </a:pPr>
+            <a:r>
+              <a:rPr lang="en-US" dirty="0"/>
+              <a:t>Phase lag in extrinsic muscle actuation: slower ramping</a:t>
+            </a:r>
+          </a:p>
+        </p:txBody>
+      </p:sp>
+      <p:pic>
+        <p:nvPicPr>
+          <p:cNvPr id="34" name="Picture 33" descr="A graph of muscle growth&#10;&#10;Description automatically generated with medium confidence">
+            <a:extLst>
+              <a:ext uri="{FF2B5EF4-FFF2-40B4-BE49-F238E27FC236}">
+                <a16:creationId xmlns:a16="http://schemas.microsoft.com/office/drawing/2014/main" id="{A0F19FE2-2D18-A3DC-DC9D-037796CB3664}"/>
+              </a:ext>
+            </a:extLst>
+          </p:cNvPr>
+          <p:cNvPicPr>
+            <a:picLocks noChangeAspect="1"/>
+          </p:cNvPicPr>
+          <p:nvPr/>
+        </p:nvPicPr>
+        <p:blipFill>
+          <a:blip r:embed="rId2">
+            <a:extLst>
+              <a:ext uri="{28A0092B-C50C-407E-A947-70E740481C1C}">
+                <a14:useLocalDpi xmlns:a14="http://schemas.microsoft.com/office/drawing/2010/main" val="0"/>
+              </a:ext>
+            </a:extLst>
+          </a:blip>
+          <a:stretch>
+            <a:fillRect/>
+          </a:stretch>
+        </p:blipFill>
+        <p:spPr>
+          <a:xfrm>
+            <a:off x="533400" y="2819825"/>
+            <a:ext cx="8574024" cy="4764024"/>
+          </a:xfrm>
+          <a:prstGeom prst="rect">
+            <a:avLst/>
+          </a:prstGeom>
+        </p:spPr>
+      </p:pic>
     </p:spTree>
     <p:extLst>
       <p:ext uri="{BB962C8B-B14F-4D97-AF65-F5344CB8AC3E}">

</xml_diff>

<commit_message>
add pre and post update
</commit_message>
<xml_diff>
--- a/output/MATLAB_scripts/results/results.pptx
+++ b/output/MATLAB_scripts/results/results.pptx
@@ -8,6 +8,7 @@
     <p:sldId id="256" r:id="rId2"/>
     <p:sldId id="258" r:id="rId3"/>
     <p:sldId id="257" r:id="rId4"/>
+    <p:sldId id="259" r:id="rId5"/>
   </p:sldIdLst>
   <p:sldSz cx="10972800" cy="13716000"/>
   <p:notesSz cx="6858000" cy="9144000"/>
@@ -245,7 +246,7 @@
           <a:p>
             <a:fld id="{B3FBCD4D-283D-4275-9B39-DEFECB59EE20}" type="datetimeFigureOut">
               <a:rPr lang="en-US" smtClean="0"/>
-              <a:t>9/12/2023</a:t>
+              <a:t>9/13/2023</a:t>
             </a:fld>
             <a:endParaRPr lang="en-US"/>
           </a:p>
@@ -415,7 +416,7 @@
           <a:p>
             <a:fld id="{B3FBCD4D-283D-4275-9B39-DEFECB59EE20}" type="datetimeFigureOut">
               <a:rPr lang="en-US" smtClean="0"/>
-              <a:t>9/12/2023</a:t>
+              <a:t>9/13/2023</a:t>
             </a:fld>
             <a:endParaRPr lang="en-US"/>
           </a:p>
@@ -595,7 +596,7 @@
           <a:p>
             <a:fld id="{B3FBCD4D-283D-4275-9B39-DEFECB59EE20}" type="datetimeFigureOut">
               <a:rPr lang="en-US" smtClean="0"/>
-              <a:t>9/12/2023</a:t>
+              <a:t>9/13/2023</a:t>
             </a:fld>
             <a:endParaRPr lang="en-US"/>
           </a:p>
@@ -765,7 +766,7 @@
           <a:p>
             <a:fld id="{B3FBCD4D-283D-4275-9B39-DEFECB59EE20}" type="datetimeFigureOut">
               <a:rPr lang="en-US" smtClean="0"/>
-              <a:t>9/12/2023</a:t>
+              <a:t>9/13/2023</a:t>
             </a:fld>
             <a:endParaRPr lang="en-US"/>
           </a:p>
@@ -1009,7 +1010,7 @@
           <a:p>
             <a:fld id="{B3FBCD4D-283D-4275-9B39-DEFECB59EE20}" type="datetimeFigureOut">
               <a:rPr lang="en-US" smtClean="0"/>
-              <a:t>9/12/2023</a:t>
+              <a:t>9/13/2023</a:t>
             </a:fld>
             <a:endParaRPr lang="en-US"/>
           </a:p>
@@ -1241,7 +1242,7 @@
           <a:p>
             <a:fld id="{B3FBCD4D-283D-4275-9B39-DEFECB59EE20}" type="datetimeFigureOut">
               <a:rPr lang="en-US" smtClean="0"/>
-              <a:t>9/12/2023</a:t>
+              <a:t>9/13/2023</a:t>
             </a:fld>
             <a:endParaRPr lang="en-US"/>
           </a:p>
@@ -1608,7 +1609,7 @@
           <a:p>
             <a:fld id="{B3FBCD4D-283D-4275-9B39-DEFECB59EE20}" type="datetimeFigureOut">
               <a:rPr lang="en-US" smtClean="0"/>
-              <a:t>9/12/2023</a:t>
+              <a:t>9/13/2023</a:t>
             </a:fld>
             <a:endParaRPr lang="en-US"/>
           </a:p>
@@ -1726,7 +1727,7 @@
           <a:p>
             <a:fld id="{B3FBCD4D-283D-4275-9B39-DEFECB59EE20}" type="datetimeFigureOut">
               <a:rPr lang="en-US" smtClean="0"/>
-              <a:t>9/12/2023</a:t>
+              <a:t>9/13/2023</a:t>
             </a:fld>
             <a:endParaRPr lang="en-US"/>
           </a:p>
@@ -1821,7 +1822,7 @@
           <a:p>
             <a:fld id="{B3FBCD4D-283D-4275-9B39-DEFECB59EE20}" type="datetimeFigureOut">
               <a:rPr lang="en-US" smtClean="0"/>
-              <a:t>9/12/2023</a:t>
+              <a:t>9/13/2023</a:t>
             </a:fld>
             <a:endParaRPr lang="en-US"/>
           </a:p>
@@ -2098,7 +2099,7 @@
           <a:p>
             <a:fld id="{B3FBCD4D-283D-4275-9B39-DEFECB59EE20}" type="datetimeFigureOut">
               <a:rPr lang="en-US" smtClean="0"/>
-              <a:t>9/12/2023</a:t>
+              <a:t>9/13/2023</a:t>
             </a:fld>
             <a:endParaRPr lang="en-US"/>
           </a:p>
@@ -2355,7 +2356,7 @@
           <a:p>
             <a:fld id="{B3FBCD4D-283D-4275-9B39-DEFECB59EE20}" type="datetimeFigureOut">
               <a:rPr lang="en-US" smtClean="0"/>
-              <a:t>9/12/2023</a:t>
+              <a:t>9/13/2023</a:t>
             </a:fld>
             <a:endParaRPr lang="en-US"/>
           </a:p>
@@ -2568,7 +2569,7 @@
           <a:p>
             <a:fld id="{B3FBCD4D-283D-4275-9B39-DEFECB59EE20}" type="datetimeFigureOut">
               <a:rPr lang="en-US" smtClean="0"/>
-              <a:t>9/12/2023</a:t>
+              <a:t>9/13/2023</a:t>
             </a:fld>
             <a:endParaRPr lang="en-US"/>
           </a:p>
@@ -5262,7 +5263,7 @@
         <p:spPr>
           <a:xfrm>
             <a:off x="6307307" y="8801100"/>
-            <a:ext cx="4336645" cy="3416320"/>
+            <a:ext cx="4336645" cy="3970318"/>
           </a:xfrm>
           <a:prstGeom prst="rect">
             <a:avLst/>
@@ -5353,6 +5354,304 @@
             <a:r>
               <a:rPr lang="en-US" dirty="0"/>
               <a:t>Asynchronously shows muscle synergy</a:t>
+            </a:r>
+          </a:p>
+          <a:p>
+            <a:pPr marL="342900" indent="-342900">
+              <a:buAutoNum type="arabicParenBoth"/>
+            </a:pPr>
+            <a:r>
+              <a:rPr lang="en-US" dirty="0"/>
+              <a:t>Geometry (del/</a:t>
+            </a:r>
+            <a:r>
+              <a:rPr lang="en-US" dirty="0" err="1"/>
+              <a:t>daz</a:t>
+            </a:r>
+            <a:r>
+              <a:rPr lang="en-US" dirty="0"/>
+              <a:t>) is dominated by ISM movement</a:t>
+            </a:r>
+          </a:p>
+        </p:txBody>
+      </p:sp>
+      <p:sp>
+        <p:nvSpPr>
+          <p:cNvPr id="2" name="TextBox 1">
+            <a:extLst>
+              <a:ext uri="{FF2B5EF4-FFF2-40B4-BE49-F238E27FC236}">
+                <a16:creationId xmlns:a16="http://schemas.microsoft.com/office/drawing/2014/main" id="{B9808501-165E-15CB-8C11-A58DEF2DA894}"/>
+              </a:ext>
+            </a:extLst>
+          </p:cNvPr>
+          <p:cNvSpPr txBox="1"/>
+          <p:nvPr/>
+        </p:nvSpPr>
+        <p:spPr>
+          <a:xfrm>
+            <a:off x="9182100" y="4572000"/>
+            <a:ext cx="1192699" cy="369332"/>
+          </a:xfrm>
+          <a:prstGeom prst="rect">
+            <a:avLst/>
+          </a:prstGeom>
+          <a:noFill/>
+        </p:spPr>
+        <p:txBody>
+          <a:bodyPr wrap="none" rtlCol="0">
+            <a:spAutoFit/>
+          </a:bodyPr>
+          <a:lstStyle/>
+          <a:p>
+            <a:r>
+              <a:rPr lang="en-US" dirty="0"/>
+              <a:t>ISM length</a:t>
+            </a:r>
+          </a:p>
+        </p:txBody>
+      </p:sp>
+      <p:sp>
+        <p:nvSpPr>
+          <p:cNvPr id="3" name="TextBox 2">
+            <a:extLst>
+              <a:ext uri="{FF2B5EF4-FFF2-40B4-BE49-F238E27FC236}">
+                <a16:creationId xmlns:a16="http://schemas.microsoft.com/office/drawing/2014/main" id="{71ED5AC2-65A4-7D8A-9A41-387B19F8FB8B}"/>
+              </a:ext>
+            </a:extLst>
+          </p:cNvPr>
+          <p:cNvSpPr txBox="1"/>
+          <p:nvPr/>
+        </p:nvSpPr>
+        <p:spPr>
+          <a:xfrm>
+            <a:off x="9123558" y="5845264"/>
+            <a:ext cx="1737463" cy="369332"/>
+          </a:xfrm>
+          <a:prstGeom prst="rect">
+            <a:avLst/>
+          </a:prstGeom>
+          <a:noFill/>
+        </p:spPr>
+        <p:txBody>
+          <a:bodyPr wrap="none" rtlCol="0">
+            <a:spAutoFit/>
+          </a:bodyPr>
+          <a:lstStyle/>
+          <a:p>
+            <a:r>
+              <a:rPr lang="en-US" dirty="0"/>
+              <a:t>C2 displacement</a:t>
+            </a:r>
+          </a:p>
+        </p:txBody>
+      </p:sp>
+      <p:sp>
+        <p:nvSpPr>
+          <p:cNvPr id="4" name="TextBox 3">
+            <a:extLst>
+              <a:ext uri="{FF2B5EF4-FFF2-40B4-BE49-F238E27FC236}">
+                <a16:creationId xmlns:a16="http://schemas.microsoft.com/office/drawing/2014/main" id="{7746BEBE-DC5B-9B17-8407-BB1C42BE1C15}"/>
+              </a:ext>
+            </a:extLst>
+          </p:cNvPr>
+          <p:cNvSpPr txBox="1"/>
+          <p:nvPr/>
+        </p:nvSpPr>
+        <p:spPr>
+          <a:xfrm>
+            <a:off x="9182100" y="7212206"/>
+            <a:ext cx="1261243" cy="369332"/>
+          </a:xfrm>
+          <a:prstGeom prst="rect">
+            <a:avLst/>
+          </a:prstGeom>
+          <a:noFill/>
+        </p:spPr>
+        <p:txBody>
+          <a:bodyPr wrap="none" rtlCol="0">
+            <a:spAutoFit/>
+          </a:bodyPr>
+          <a:lstStyle/>
+          <a:p>
+            <a:r>
+              <a:rPr lang="en-US" dirty="0"/>
+              <a:t>Orientation</a:t>
+            </a:r>
+          </a:p>
+        </p:txBody>
+      </p:sp>
+      <p:sp>
+        <p:nvSpPr>
+          <p:cNvPr id="6" name="TextBox 5">
+            <a:extLst>
+              <a:ext uri="{FF2B5EF4-FFF2-40B4-BE49-F238E27FC236}">
+                <a16:creationId xmlns:a16="http://schemas.microsoft.com/office/drawing/2014/main" id="{82541A8C-775A-E7AC-9157-6C69DA06CB26}"/>
+              </a:ext>
+            </a:extLst>
+          </p:cNvPr>
+          <p:cNvSpPr txBox="1"/>
+          <p:nvPr/>
+        </p:nvSpPr>
+        <p:spPr>
+          <a:xfrm>
+            <a:off x="1326164" y="7581538"/>
+            <a:ext cx="1487805" cy="369332"/>
+          </a:xfrm>
+          <a:prstGeom prst="rect">
+            <a:avLst/>
+          </a:prstGeom>
+          <a:noFill/>
+        </p:spPr>
+        <p:txBody>
+          <a:bodyPr wrap="square">
+            <a:spAutoFit/>
+          </a:bodyPr>
+          <a:lstStyle/>
+          <a:p>
+            <a:r>
+              <a:rPr lang="en-US" dirty="0"/>
+              <a:t>0.25 +/- 0.05</a:t>
+            </a:r>
+          </a:p>
+        </p:txBody>
+      </p:sp>
+      <p:sp>
+        <p:nvSpPr>
+          <p:cNvPr id="10" name="TextBox 9">
+            <a:extLst>
+              <a:ext uri="{FF2B5EF4-FFF2-40B4-BE49-F238E27FC236}">
+                <a16:creationId xmlns:a16="http://schemas.microsoft.com/office/drawing/2014/main" id="{AA9602C9-C982-BA02-764B-030717CD3684}"/>
+              </a:ext>
+            </a:extLst>
+          </p:cNvPr>
+          <p:cNvSpPr txBox="1"/>
+          <p:nvPr/>
+        </p:nvSpPr>
+        <p:spPr>
+          <a:xfrm>
+            <a:off x="4312351" y="7602045"/>
+            <a:ext cx="1381125" cy="369332"/>
+          </a:xfrm>
+          <a:prstGeom prst="rect">
+            <a:avLst/>
+          </a:prstGeom>
+          <a:noFill/>
+        </p:spPr>
+        <p:txBody>
+          <a:bodyPr wrap="square">
+            <a:spAutoFit/>
+          </a:bodyPr>
+          <a:lstStyle/>
+          <a:p>
+            <a:r>
+              <a:rPr lang="en-US"/>
+              <a:t>0.42 +/- 0.20</a:t>
+            </a:r>
+            <a:endParaRPr lang="en-US" dirty="0"/>
+          </a:p>
+        </p:txBody>
+      </p:sp>
+      <p:sp>
+        <p:nvSpPr>
+          <p:cNvPr id="12" name="TextBox 11">
+            <a:extLst>
+              <a:ext uri="{FF2B5EF4-FFF2-40B4-BE49-F238E27FC236}">
+                <a16:creationId xmlns:a16="http://schemas.microsoft.com/office/drawing/2014/main" id="{14E52CBF-600F-9E93-3E58-4484450C3C50}"/>
+              </a:ext>
+            </a:extLst>
+          </p:cNvPr>
+          <p:cNvSpPr txBox="1"/>
+          <p:nvPr/>
+        </p:nvSpPr>
+        <p:spPr>
+          <a:xfrm>
+            <a:off x="7305675" y="7556892"/>
+            <a:ext cx="1487805" cy="369332"/>
+          </a:xfrm>
+          <a:prstGeom prst="rect">
+            <a:avLst/>
+          </a:prstGeom>
+          <a:noFill/>
+        </p:spPr>
+        <p:txBody>
+          <a:bodyPr wrap="square">
+            <a:spAutoFit/>
+          </a:bodyPr>
+          <a:lstStyle/>
+          <a:p>
+            <a:r>
+              <a:rPr lang="en-US" dirty="0"/>
+              <a:t>0.22 +/- 0.05</a:t>
+            </a:r>
+          </a:p>
+        </p:txBody>
+      </p:sp>
+      <p:sp>
+        <p:nvSpPr>
+          <p:cNvPr id="16" name="TextBox 15">
+            <a:extLst>
+              <a:ext uri="{FF2B5EF4-FFF2-40B4-BE49-F238E27FC236}">
+                <a16:creationId xmlns:a16="http://schemas.microsoft.com/office/drawing/2014/main" id="{B27D1135-DFDD-1E98-B398-B678DF2A1B51}"/>
+              </a:ext>
+            </a:extLst>
+          </p:cNvPr>
+          <p:cNvSpPr txBox="1"/>
+          <p:nvPr/>
+        </p:nvSpPr>
+        <p:spPr>
+          <a:xfrm>
+            <a:off x="1542936" y="12086683"/>
+            <a:ext cx="1487805" cy="369332"/>
+          </a:xfrm>
+          <a:prstGeom prst="rect">
+            <a:avLst/>
+          </a:prstGeom>
+          <a:noFill/>
+        </p:spPr>
+        <p:txBody>
+          <a:bodyPr wrap="square">
+            <a:spAutoFit/>
+          </a:bodyPr>
+          <a:lstStyle/>
+          <a:p>
+            <a:r>
+              <a:rPr lang="en-US" dirty="0"/>
+              <a:t>0.18 +/- 0.52</a:t>
+            </a:r>
+          </a:p>
+        </p:txBody>
+      </p:sp>
+      <p:sp>
+        <p:nvSpPr>
+          <p:cNvPr id="18" name="TextBox 17">
+            <a:extLst>
+              <a:ext uri="{FF2B5EF4-FFF2-40B4-BE49-F238E27FC236}">
+                <a16:creationId xmlns:a16="http://schemas.microsoft.com/office/drawing/2014/main" id="{8031C366-4BBA-33BB-FB1F-AFD42F88F371}"/>
+              </a:ext>
+            </a:extLst>
+          </p:cNvPr>
+          <p:cNvSpPr txBox="1"/>
+          <p:nvPr/>
+        </p:nvSpPr>
+        <p:spPr>
+          <a:xfrm>
+            <a:off x="4401960" y="12107190"/>
+            <a:ext cx="1487805" cy="369332"/>
+          </a:xfrm>
+          <a:prstGeom prst="rect">
+            <a:avLst/>
+          </a:prstGeom>
+          <a:noFill/>
+        </p:spPr>
+        <p:txBody>
+          <a:bodyPr wrap="square">
+            <a:spAutoFit/>
+          </a:bodyPr>
+          <a:lstStyle/>
+          <a:p>
+            <a:r>
+              <a:rPr lang="en-US" dirty="0"/>
+              <a:t>0.24 +/- 0.08</a:t>
             </a:r>
           </a:p>
         </p:txBody>
@@ -6408,8 +6707,8 @@
         </p:nvSpPr>
         <p:spPr>
           <a:xfrm>
-            <a:off x="1120165" y="11676927"/>
-            <a:ext cx="7227039" cy="923330"/>
+            <a:off x="1016001" y="9276627"/>
+            <a:ext cx="7227039" cy="1477328"/>
           </a:xfrm>
           <a:prstGeom prst="rect">
             <a:avLst/>
@@ -6429,11 +6728,22 @@
           </a:p>
           <a:p>
             <a:pPr marL="342900" indent="-342900">
+              <a:buFontTx/>
               <a:buAutoNum type="arabicParenBoth"/>
             </a:pPr>
             <a:r>
               <a:rPr lang="en-US" dirty="0"/>
-              <a:t>Compare to kinematic profile (slow raping up and fast retraction)</a:t>
+              <a:t>Intrinsic muscle activation profile</a:t>
+            </a:r>
+          </a:p>
+          <a:p>
+            <a:pPr marL="342900" indent="-342900">
+              <a:buFontTx/>
+              <a:buAutoNum type="arabicParenBoth"/>
+            </a:pPr>
+            <a:r>
+              <a:rPr lang="en-US" dirty="0"/>
+              <a:t>Phase lag in extrinsic muscle actuation: slower ramping</a:t>
             </a:r>
           </a:p>
           <a:p>
@@ -6442,8 +6752,14 @@
             </a:pPr>
             <a:r>
               <a:rPr lang="en-US" dirty="0"/>
-              <a:t>Phase lag in extrinsic muscle actuation: slower ramping</a:t>
-            </a:r>
+              <a:t>Compare to kinematic profile (slow raping up and fast retraction)</a:t>
+            </a:r>
+          </a:p>
+          <a:p>
+            <a:pPr marL="342900" indent="-342900">
+              <a:buAutoNum type="arabicParenBoth"/>
+            </a:pPr>
+            <a:endParaRPr lang="en-US" dirty="0"/>
           </a:p>
         </p:txBody>
       </p:sp>
@@ -6475,8 +6791,253 @@
         </p:blipFill>
         <p:spPr>
           <a:xfrm>
-            <a:off x="533400" y="2819825"/>
+            <a:off x="644982" y="2962045"/>
             <a:ext cx="8574024" cy="4764024"/>
+          </a:xfrm>
+          <a:prstGeom prst="rect">
+            <a:avLst/>
+          </a:prstGeom>
+        </p:spPr>
+      </p:pic>
+      <p:pic>
+        <p:nvPicPr>
+          <p:cNvPr id="4" name="Picture 3">
+            <a:extLst>
+              <a:ext uri="{FF2B5EF4-FFF2-40B4-BE49-F238E27FC236}">
+                <a16:creationId xmlns:a16="http://schemas.microsoft.com/office/drawing/2014/main" id="{576CDE46-1EE1-BF5D-0CC9-77CA97D0E9A7}"/>
+              </a:ext>
+            </a:extLst>
+          </p:cNvPr>
+          <p:cNvPicPr>
+            <a:picLocks noChangeAspect="1"/>
+          </p:cNvPicPr>
+          <p:nvPr/>
+        </p:nvPicPr>
+        <p:blipFill>
+          <a:blip r:embed="rId3"/>
+          <a:stretch>
+            <a:fillRect/>
+          </a:stretch>
+        </p:blipFill>
+        <p:spPr>
+          <a:xfrm>
+            <a:off x="3222143" y="7434390"/>
+            <a:ext cx="2960041" cy="823785"/>
+          </a:xfrm>
+          <a:prstGeom prst="rect">
+            <a:avLst/>
+          </a:prstGeom>
+        </p:spPr>
+      </p:pic>
+      <p:pic>
+        <p:nvPicPr>
+          <p:cNvPr id="8" name="Picture 7">
+            <a:extLst>
+              <a:ext uri="{FF2B5EF4-FFF2-40B4-BE49-F238E27FC236}">
+                <a16:creationId xmlns:a16="http://schemas.microsoft.com/office/drawing/2014/main" id="{0657B53C-97F3-92CC-5164-4BD59BF52D6D}"/>
+              </a:ext>
+            </a:extLst>
+          </p:cNvPr>
+          <p:cNvPicPr>
+            <a:picLocks noChangeAspect="1"/>
+          </p:cNvPicPr>
+          <p:nvPr/>
+        </p:nvPicPr>
+        <p:blipFill>
+          <a:blip r:embed="rId4"/>
+          <a:stretch>
+            <a:fillRect/>
+          </a:stretch>
+        </p:blipFill>
+        <p:spPr>
+          <a:xfrm>
+            <a:off x="3925752" y="5977877"/>
+            <a:ext cx="1335047" cy="685564"/>
+          </a:xfrm>
+          <a:prstGeom prst="rect">
+            <a:avLst/>
+          </a:prstGeom>
+        </p:spPr>
+      </p:pic>
+      <p:pic>
+        <p:nvPicPr>
+          <p:cNvPr id="10" name="Picture 9">
+            <a:extLst>
+              <a:ext uri="{FF2B5EF4-FFF2-40B4-BE49-F238E27FC236}">
+                <a16:creationId xmlns:a16="http://schemas.microsoft.com/office/drawing/2014/main" id="{6A9DF038-480C-FBBC-9812-6822079E1A87}"/>
+              </a:ext>
+            </a:extLst>
+          </p:cNvPr>
+          <p:cNvPicPr>
+            <a:picLocks noChangeAspect="1"/>
+          </p:cNvPicPr>
+          <p:nvPr/>
+        </p:nvPicPr>
+        <p:blipFill>
+          <a:blip r:embed="rId5"/>
+          <a:stretch>
+            <a:fillRect/>
+          </a:stretch>
+        </p:blipFill>
+        <p:spPr>
+          <a:xfrm flipV="1">
+            <a:off x="2839055" y="2717975"/>
+            <a:ext cx="1423244" cy="630842"/>
+          </a:xfrm>
+          <a:prstGeom prst="rect">
+            <a:avLst/>
+          </a:prstGeom>
+        </p:spPr>
+      </p:pic>
+      <p:sp>
+        <p:nvSpPr>
+          <p:cNvPr id="11" name="TextBox 10">
+            <a:extLst>
+              <a:ext uri="{FF2B5EF4-FFF2-40B4-BE49-F238E27FC236}">
+                <a16:creationId xmlns:a16="http://schemas.microsoft.com/office/drawing/2014/main" id="{A4391FC0-6C3A-EA35-591E-78115AD68EE5}"/>
+              </a:ext>
+            </a:extLst>
+          </p:cNvPr>
+          <p:cNvSpPr txBox="1"/>
+          <p:nvPr/>
+        </p:nvSpPr>
+        <p:spPr>
+          <a:xfrm>
+            <a:off x="103079" y="3995738"/>
+            <a:ext cx="1430446" cy="923330"/>
+          </a:xfrm>
+          <a:prstGeom prst="rect">
+            <a:avLst/>
+          </a:prstGeom>
+          <a:noFill/>
+        </p:spPr>
+        <p:txBody>
+          <a:bodyPr wrap="square" rtlCol="0">
+            <a:spAutoFit/>
+          </a:bodyPr>
+          <a:lstStyle/>
+          <a:p>
+            <a:r>
+              <a:rPr lang="en-US" dirty="0"/>
+              <a:t>Compare muscle force with EMG</a:t>
+            </a:r>
+          </a:p>
+        </p:txBody>
+      </p:sp>
+    </p:spTree>
+    <p:extLst>
+      <p:ext uri="{BB962C8B-B14F-4D97-AF65-F5344CB8AC3E}">
+        <p14:creationId xmlns:p14="http://schemas.microsoft.com/office/powerpoint/2010/main" val="2149538306"/>
+      </p:ext>
+    </p:extLst>
+  </p:cSld>
+  <p:clrMapOvr>
+    <a:masterClrMapping/>
+  </p:clrMapOvr>
+</p:sld>
+</file>
+
+<file path=ppt/slides/slide4.xml><?xml version="1.0" encoding="utf-8"?>
+<p:sld xmlns:a="http://schemas.openxmlformats.org/drawingml/2006/main" xmlns:r="http://schemas.openxmlformats.org/officeDocument/2006/relationships" xmlns:p="http://schemas.openxmlformats.org/presentationml/2006/main">
+  <p:cSld>
+    <p:spTree>
+      <p:nvGrpSpPr>
+        <p:cNvPr id="1" name=""/>
+        <p:cNvGrpSpPr/>
+        <p:nvPr/>
+      </p:nvGrpSpPr>
+      <p:grpSpPr>
+        <a:xfrm>
+          <a:off x="0" y="0"/>
+          <a:ext cx="0" cy="0"/>
+          <a:chOff x="0" y="0"/>
+          <a:chExt cx="0" cy="0"/>
+        </a:xfrm>
+      </p:grpSpPr>
+      <p:pic>
+        <p:nvPicPr>
+          <p:cNvPr id="5" name="Picture 4">
+            <a:extLst>
+              <a:ext uri="{FF2B5EF4-FFF2-40B4-BE49-F238E27FC236}">
+                <a16:creationId xmlns:a16="http://schemas.microsoft.com/office/drawing/2014/main" id="{6B92469F-042A-245B-442F-E3EA06E453CE}"/>
+              </a:ext>
+            </a:extLst>
+          </p:cNvPr>
+          <p:cNvPicPr>
+            <a:picLocks noChangeAspect="1"/>
+          </p:cNvPicPr>
+          <p:nvPr/>
+        </p:nvPicPr>
+        <p:blipFill>
+          <a:blip r:embed="rId2"/>
+          <a:stretch>
+            <a:fillRect/>
+          </a:stretch>
+        </p:blipFill>
+        <p:spPr>
+          <a:xfrm>
+            <a:off x="432682" y="3342784"/>
+            <a:ext cx="10107436" cy="7030431"/>
+          </a:xfrm>
+          <a:prstGeom prst="rect">
+            <a:avLst/>
+          </a:prstGeom>
+        </p:spPr>
+      </p:pic>
+      <p:pic>
+        <p:nvPicPr>
+          <p:cNvPr id="6" name="Picture 5">
+            <a:extLst>
+              <a:ext uri="{FF2B5EF4-FFF2-40B4-BE49-F238E27FC236}">
+                <a16:creationId xmlns:a16="http://schemas.microsoft.com/office/drawing/2014/main" id="{16FF4834-06CA-BF87-09AB-64FEFAFC8255}"/>
+              </a:ext>
+            </a:extLst>
+          </p:cNvPr>
+          <p:cNvPicPr>
+            <a:picLocks noChangeAspect="1"/>
+          </p:cNvPicPr>
+          <p:nvPr/>
+        </p:nvPicPr>
+        <p:blipFill>
+          <a:blip r:embed="rId3"/>
+          <a:stretch>
+            <a:fillRect/>
+          </a:stretch>
+        </p:blipFill>
+        <p:spPr>
+          <a:xfrm flipV="1">
+            <a:off x="2324704" y="3076575"/>
+            <a:ext cx="1710162" cy="758016"/>
+          </a:xfrm>
+          <a:prstGeom prst="rect">
+            <a:avLst/>
+          </a:prstGeom>
+        </p:spPr>
+      </p:pic>
+      <p:pic>
+        <p:nvPicPr>
+          <p:cNvPr id="7" name="Picture 6">
+            <a:extLst>
+              <a:ext uri="{FF2B5EF4-FFF2-40B4-BE49-F238E27FC236}">
+                <a16:creationId xmlns:a16="http://schemas.microsoft.com/office/drawing/2014/main" id="{309444FB-D2C3-490B-3009-4287B821AD3B}"/>
+              </a:ext>
+            </a:extLst>
+          </p:cNvPr>
+          <p:cNvPicPr>
+            <a:picLocks noChangeAspect="1"/>
+          </p:cNvPicPr>
+          <p:nvPr/>
+        </p:nvPicPr>
+        <p:blipFill>
+          <a:blip r:embed="rId4"/>
+          <a:stretch>
+            <a:fillRect/>
+          </a:stretch>
+        </p:blipFill>
+        <p:spPr>
+          <a:xfrm>
+            <a:off x="3788938" y="7975600"/>
+            <a:ext cx="1986336" cy="1020009"/>
           </a:xfrm>
           <a:prstGeom prst="rect">
             <a:avLst/>
@@ -6486,7 +7047,7 @@
     </p:spTree>
     <p:extLst>
       <p:ext uri="{BB962C8B-B14F-4D97-AF65-F5344CB8AC3E}">
-        <p14:creationId xmlns:p14="http://schemas.microsoft.com/office/powerpoint/2010/main" val="2149538306"/>
+        <p14:creationId xmlns:p14="http://schemas.microsoft.com/office/powerpoint/2010/main" val="1891851961"/>
       </p:ext>
     </p:extLst>
   </p:cSld>

</xml_diff>